<commit_message>
Added slides on github command basics to start guide.
</commit_message>
<xml_diff>
--- a/start_guide.pptx
+++ b/start_guide.pptx
@@ -11,6 +11,8 @@
     <p:sldId id="259" r:id="rId5"/>
     <p:sldId id="260" r:id="rId6"/>
     <p:sldId id="261" r:id="rId7"/>
+    <p:sldId id="262" r:id="rId8"/>
+    <p:sldId id="263" r:id="rId9"/>
   </p:sldIdLst>
   <p:sldSz cx="12192000" cy="6858000"/>
   <p:notesSz cx="6858000" cy="9144000"/>
@@ -4038,7 +4040,9 @@
           <a:prstGeom prst="rect">
             <a:avLst/>
           </a:prstGeom>
-          <a:noFill/>
+          <a:solidFill>
+            <a:srgbClr val="FF0000"/>
+          </a:solidFill>
         </p:spPr>
         <p:txBody>
           <a:bodyPr wrap="square">
@@ -4049,7 +4053,7 @@
             <a:r>
               <a:rPr lang="en-US" sz="1400" i="1" dirty="0">
                 <a:solidFill>
-                  <a:srgbClr val="FF0000"/>
+                  <a:schemeClr val="bg1"/>
                 </a:solidFill>
               </a:rPr>
               <a:t>Create the folder to hold </a:t>
@@ -4057,14 +4061,14 @@
             <a:r>
               <a:rPr lang="en-US" sz="1400" i="1" dirty="0" err="1">
                 <a:solidFill>
-                  <a:srgbClr val="FF0000"/>
+                  <a:schemeClr val="bg1"/>
                 </a:solidFill>
               </a:rPr>
               <a:t>common_code</a:t>
             </a:r>
             <a:endParaRPr lang="en-US" sz="1400" i="1" dirty="0">
               <a:solidFill>
-                <a:srgbClr val="FF0000"/>
+                <a:schemeClr val="bg1"/>
               </a:solidFill>
             </a:endParaRPr>
           </a:p>
@@ -5295,6 +5299,367 @@
     <p:extLst>
       <p:ext uri="{BB962C8B-B14F-4D97-AF65-F5344CB8AC3E}">
         <p14:creationId xmlns:p14="http://schemas.microsoft.com/office/powerpoint/2010/main" val="2774382654"/>
+      </p:ext>
+    </p:extLst>
+  </p:cSld>
+  <p:clrMapOvr>
+    <a:masterClrMapping/>
+  </p:clrMapOvr>
+</p:sld>
+</file>
+
+<file path=ppt/slides/slide7.xml><?xml version="1.0" encoding="utf-8"?>
+<p:sld xmlns:a="http://schemas.openxmlformats.org/drawingml/2006/main" xmlns:r="http://schemas.openxmlformats.org/officeDocument/2006/relationships" xmlns:p="http://schemas.openxmlformats.org/presentationml/2006/main">
+  <p:cSld>
+    <p:spTree>
+      <p:nvGrpSpPr>
+        <p:cNvPr id="1" name=""/>
+        <p:cNvGrpSpPr/>
+        <p:nvPr/>
+      </p:nvGrpSpPr>
+      <p:grpSpPr>
+        <a:xfrm>
+          <a:off x="0" y="0"/>
+          <a:ext cx="0" cy="0"/>
+          <a:chOff x="0" y="0"/>
+          <a:chExt cx="0" cy="0"/>
+        </a:xfrm>
+      </p:grpSpPr>
+      <p:sp>
+        <p:nvSpPr>
+          <p:cNvPr id="2" name="Title 1">
+            <a:extLst>
+              <a:ext uri="{FF2B5EF4-FFF2-40B4-BE49-F238E27FC236}">
+                <a16:creationId xmlns:a16="http://schemas.microsoft.com/office/drawing/2014/main" id="{E76F4F84-8F82-FA8C-A42A-F4D7A48C6466}"/>
+              </a:ext>
+            </a:extLst>
+          </p:cNvPr>
+          <p:cNvSpPr>
+            <a:spLocks noGrp="1"/>
+          </p:cNvSpPr>
+          <p:nvPr>
+            <p:ph type="title"/>
+          </p:nvPr>
+        </p:nvSpPr>
+        <p:spPr/>
+        <p:txBody>
+          <a:bodyPr/>
+          <a:lstStyle/>
+          <a:p>
+            <a:r>
+              <a:rPr lang="en-US" dirty="0" err="1"/>
+              <a:t>Github</a:t>
+            </a:r>
+            <a:r>
+              <a:rPr lang="en-US" dirty="0"/>
+              <a:t> basics</a:t>
+            </a:r>
+          </a:p>
+        </p:txBody>
+      </p:sp>
+      <p:sp>
+        <p:nvSpPr>
+          <p:cNvPr id="3" name="Content Placeholder 2">
+            <a:extLst>
+              <a:ext uri="{FF2B5EF4-FFF2-40B4-BE49-F238E27FC236}">
+                <a16:creationId xmlns:a16="http://schemas.microsoft.com/office/drawing/2014/main" id="{33CDC2A9-9CBD-82D4-EEAC-D69B14A7A2CC}"/>
+              </a:ext>
+            </a:extLst>
+          </p:cNvPr>
+          <p:cNvSpPr>
+            <a:spLocks noGrp="1"/>
+          </p:cNvSpPr>
+          <p:nvPr>
+            <p:ph idx="1"/>
+          </p:nvPr>
+        </p:nvSpPr>
+        <p:spPr>
+          <a:xfrm>
+            <a:off x="838200" y="1825625"/>
+            <a:ext cx="10777330" cy="4469158"/>
+          </a:xfrm>
+        </p:spPr>
+        <p:txBody>
+          <a:bodyPr>
+            <a:normAutofit fontScale="62500" lnSpcReduction="20000"/>
+          </a:bodyPr>
+          <a:lstStyle/>
+          <a:p>
+            <a:r>
+              <a:rPr lang="en-US" dirty="0"/>
+              <a:t>Git is a local program that can track changes made in files on your system. This can be useful if you want to ensure you are able to track down issues with specific lines and stop having files named stuff like “analysis_working_v2_final_old.py”.</a:t>
+            </a:r>
+          </a:p>
+          <a:p>
+            <a:r>
+              <a:rPr lang="en-US" dirty="0"/>
+              <a:t>To make a repository, you need to tell git which files to track changes in, add them to be possibly included in the repository (staged), and commit (save) the changes. These changes are tracked by a .git file which is contained in the root of the </a:t>
+            </a:r>
+            <a:r>
+              <a:rPr lang="en-US" dirty="0" err="1"/>
+              <a:t>common_code</a:t>
+            </a:r>
+            <a:r>
+              <a:rPr lang="en-US" dirty="0"/>
+              <a:t> directory.</a:t>
+            </a:r>
+          </a:p>
+          <a:p>
+            <a:pPr lvl="1"/>
+            <a:r>
+              <a:rPr lang="en-US" dirty="0"/>
+              <a:t>You can access remote </a:t>
+            </a:r>
+            <a:r>
+              <a:rPr lang="en-US" dirty="0" err="1"/>
+              <a:t>github</a:t>
+            </a:r>
+            <a:r>
+              <a:rPr lang="en-US" dirty="0"/>
+              <a:t> repositories if you are logged in via an email address and a local-remote SSH key pair. This connects your local git to the remote repository.</a:t>
+            </a:r>
+          </a:p>
+          <a:p>
+            <a:r>
+              <a:rPr lang="en-US" dirty="0"/>
+              <a:t>Some important functions:</a:t>
+            </a:r>
+          </a:p>
+          <a:p>
+            <a:pPr lvl="1"/>
+            <a:r>
+              <a:rPr lang="en-US" dirty="0"/>
+              <a:t>Git add x: Add file x (or the changes made to x) to be “staged” (i.e. ready to commit to the local </a:t>
+            </a:r>
+            <a:r>
+              <a:rPr lang="en-US" dirty="0" err="1"/>
+              <a:t>github</a:t>
+            </a:r>
+            <a:r>
+              <a:rPr lang="en-US" dirty="0"/>
+              <a:t> repository)</a:t>
+            </a:r>
+          </a:p>
+          <a:p>
+            <a:pPr lvl="1"/>
+            <a:r>
+              <a:rPr lang="en-US" dirty="0"/>
+              <a:t>Git commit –m “Short description of change”: Commits the changes made to all added files with message “Short description of change”. All commits require a message, so please make sure it is short (~75 characters) and direct about what changes are made.</a:t>
+            </a:r>
+          </a:p>
+          <a:p>
+            <a:pPr lvl="1"/>
+            <a:r>
+              <a:rPr lang="en-US" dirty="0"/>
+              <a:t>Git status: Check which files have </a:t>
+            </a:r>
+            <a:r>
+              <a:rPr lang="en-US"/>
+              <a:t>been changed compared to the last time you committed.</a:t>
+            </a:r>
+            <a:endParaRPr lang="en-US" dirty="0"/>
+          </a:p>
+          <a:p>
+            <a:pPr lvl="1"/>
+            <a:r>
+              <a:rPr lang="en-US" dirty="0"/>
+              <a:t>Git diff x: Check the differences between your updated copy of x and the most recently committed version of x.</a:t>
+            </a:r>
+          </a:p>
+          <a:p>
+            <a:pPr lvl="1"/>
+            <a:r>
+              <a:rPr lang="en-US" dirty="0"/>
+              <a:t>Git restore x: Restore x to the state it was in the last time it was committed.</a:t>
+            </a:r>
+          </a:p>
+          <a:p>
+            <a:pPr lvl="1"/>
+            <a:r>
+              <a:rPr lang="en-US" dirty="0"/>
+              <a:t>Git remote add origin url: add branch “origin” to the remote repository (i.e. </a:t>
+            </a:r>
+            <a:r>
+              <a:rPr lang="en-US" dirty="0" err="1"/>
+              <a:t>github</a:t>
+            </a:r>
+            <a:r>
+              <a:rPr lang="en-US" dirty="0"/>
+              <a:t>) at the given </a:t>
+            </a:r>
+            <a:r>
+              <a:rPr lang="en-US" dirty="0" err="1"/>
+              <a:t>url</a:t>
+            </a:r>
+            <a:r>
+              <a:rPr lang="en-US" dirty="0"/>
+              <a:t>.</a:t>
+            </a:r>
+          </a:p>
+          <a:p>
+            <a:pPr lvl="1"/>
+            <a:r>
+              <a:rPr lang="en-US" dirty="0"/>
+              <a:t>Git pull: Pull the most recent version of the repository from the remote repository location.</a:t>
+            </a:r>
+          </a:p>
+          <a:p>
+            <a:pPr lvl="1"/>
+            <a:r>
+              <a:rPr lang="en-US" b="1" dirty="0"/>
+              <a:t>Note that these commands must be called from within </a:t>
+            </a:r>
+            <a:r>
+              <a:rPr lang="en-US" b="1" dirty="0" err="1"/>
+              <a:t>common_code</a:t>
+            </a:r>
+            <a:r>
+              <a:rPr lang="en-US" b="1" dirty="0"/>
+              <a:t>!</a:t>
+            </a:r>
+          </a:p>
+        </p:txBody>
+      </p:sp>
+    </p:spTree>
+    <p:extLst>
+      <p:ext uri="{BB962C8B-B14F-4D97-AF65-F5344CB8AC3E}">
+        <p14:creationId xmlns:p14="http://schemas.microsoft.com/office/powerpoint/2010/main" val="124115520"/>
+      </p:ext>
+    </p:extLst>
+  </p:cSld>
+  <p:clrMapOvr>
+    <a:masterClrMapping/>
+  </p:clrMapOvr>
+</p:sld>
+</file>
+
+<file path=ppt/slides/slide8.xml><?xml version="1.0" encoding="utf-8"?>
+<p:sld xmlns:a="http://schemas.openxmlformats.org/drawingml/2006/main" xmlns:r="http://schemas.openxmlformats.org/officeDocument/2006/relationships" xmlns:p="http://schemas.openxmlformats.org/presentationml/2006/main">
+  <p:cSld>
+    <p:spTree>
+      <p:nvGrpSpPr>
+        <p:cNvPr id="1" name=""/>
+        <p:cNvGrpSpPr/>
+        <p:nvPr/>
+      </p:nvGrpSpPr>
+      <p:grpSpPr>
+        <a:xfrm>
+          <a:off x="0" y="0"/>
+          <a:ext cx="0" cy="0"/>
+          <a:chOff x="0" y="0"/>
+          <a:chExt cx="0" cy="0"/>
+        </a:xfrm>
+      </p:grpSpPr>
+      <p:sp>
+        <p:nvSpPr>
+          <p:cNvPr id="2" name="Title 1">
+            <a:extLst>
+              <a:ext uri="{FF2B5EF4-FFF2-40B4-BE49-F238E27FC236}">
+                <a16:creationId xmlns:a16="http://schemas.microsoft.com/office/drawing/2014/main" id="{EFEB170C-5406-3308-2078-CCCCB891D6E8}"/>
+              </a:ext>
+            </a:extLst>
+          </p:cNvPr>
+          <p:cNvSpPr>
+            <a:spLocks noGrp="1"/>
+          </p:cNvSpPr>
+          <p:nvPr>
+            <p:ph type="title"/>
+          </p:nvPr>
+        </p:nvSpPr>
+        <p:spPr/>
+        <p:txBody>
+          <a:bodyPr/>
+          <a:lstStyle/>
+          <a:p>
+            <a:r>
+              <a:rPr lang="en-US" dirty="0"/>
+              <a:t>Reporting issues</a:t>
+            </a:r>
+          </a:p>
+        </p:txBody>
+      </p:sp>
+      <p:sp>
+        <p:nvSpPr>
+          <p:cNvPr id="3" name="Content Placeholder 2">
+            <a:extLst>
+              <a:ext uri="{FF2B5EF4-FFF2-40B4-BE49-F238E27FC236}">
+                <a16:creationId xmlns:a16="http://schemas.microsoft.com/office/drawing/2014/main" id="{F26E4D2E-762D-D491-1517-CE00F1D0042A}"/>
+              </a:ext>
+            </a:extLst>
+          </p:cNvPr>
+          <p:cNvSpPr>
+            <a:spLocks noGrp="1"/>
+          </p:cNvSpPr>
+          <p:nvPr>
+            <p:ph idx="1"/>
+          </p:nvPr>
+        </p:nvSpPr>
+        <p:spPr/>
+        <p:txBody>
+          <a:bodyPr/>
+          <a:lstStyle/>
+          <a:p>
+            <a:r>
+              <a:rPr lang="en-US" dirty="0"/>
+              <a:t>If you find any issues, you can report them by going to the </a:t>
+            </a:r>
+            <a:r>
+              <a:rPr lang="en-US" dirty="0" err="1"/>
+              <a:t>common_code</a:t>
+            </a:r>
+            <a:r>
+              <a:rPr lang="en-US" dirty="0"/>
+              <a:t> repo, then selecting the “issues” tab. This is located at </a:t>
+            </a:r>
+            <a:r>
+              <a:rPr lang="en-US" dirty="0">
+                <a:hlinkClick r:id="rId2"/>
+              </a:rPr>
+              <a:t>Issues · </a:t>
+            </a:r>
+            <a:r>
+              <a:rPr lang="en-US" dirty="0" err="1">
+                <a:hlinkClick r:id="rId2"/>
+              </a:rPr>
+              <a:t>jmaniscool</a:t>
+            </a:r>
+            <a:r>
+              <a:rPr lang="en-US" dirty="0">
+                <a:hlinkClick r:id="rId2"/>
+              </a:rPr>
+              <a:t>/</a:t>
+            </a:r>
+            <a:r>
+              <a:rPr lang="en-US" dirty="0" err="1">
+                <a:hlinkClick r:id="rId2"/>
+              </a:rPr>
+              <a:t>common_code</a:t>
+            </a:r>
+            <a:r>
+              <a:rPr lang="en-US" dirty="0"/>
+              <a:t>.</a:t>
+            </a:r>
+          </a:p>
+          <a:p>
+            <a:pPr lvl="1"/>
+            <a:r>
+              <a:rPr lang="en-US" dirty="0"/>
+              <a:t>When opening an issue, please include a minimal working example to show how the code is broken and what the expected behavior is.</a:t>
+            </a:r>
+          </a:p>
+          <a:p>
+            <a:pPr lvl="1"/>
+            <a:r>
+              <a:rPr lang="en-US" dirty="0"/>
+              <a:t>The more specific you are, the better the fix will be (i.e. better documentation).</a:t>
+            </a:r>
+          </a:p>
+        </p:txBody>
+      </p:sp>
+    </p:spTree>
+    <p:extLst>
+      <p:ext uri="{BB962C8B-B14F-4D97-AF65-F5344CB8AC3E}">
+        <p14:creationId xmlns:p14="http://schemas.microsoft.com/office/powerpoint/2010/main" val="4163278239"/>
       </p:ext>
     </p:extLst>
   </p:cSld>

</xml_diff>

<commit_message>
Minor change to phrasing.
</commit_message>
<xml_diff>
--- a/start_guide.pptx
+++ b/start_guide.pptx
@@ -4374,7 +4374,7 @@
         </p:spPr>
         <p:txBody>
           <a:bodyPr>
-            <a:normAutofit fontScale="85000" lnSpcReduction="10000"/>
+            <a:normAutofit fontScale="85000" lnSpcReduction="20000"/>
           </a:bodyPr>
           <a:lstStyle/>
           <a:p>
@@ -4395,7 +4395,7 @@
             <a:pPr lvl="1"/>
             <a:r>
               <a:rPr lang="en-US" dirty="0"/>
-              <a:t>The trick is that it has an __init__.py file which tells Python to treat the directory as a library. __init__.py also contains the names and locations for all functions in </a:t>
+              <a:t>The trick is that it has an __init__.py file which tells Python to treat the directory as a library. __init__.py also contains the names and locations for all functions accessible by </a:t>
             </a:r>
             <a:r>
               <a:rPr lang="en-US" dirty="0" err="1"/>
@@ -5451,13 +5451,8 @@
             <a:pPr lvl="1"/>
             <a:r>
               <a:rPr lang="en-US" dirty="0"/>
-              <a:t>Git status: Check which files have </a:t>
-            </a:r>
-            <a:r>
-              <a:rPr lang="en-US"/>
-              <a:t>been changed compared to the last time you committed.</a:t>
-            </a:r>
-            <a:endParaRPr lang="en-US" dirty="0"/>
+              <a:t>Git status: Check which files have been changed compared to the last time you committed.</a:t>
+            </a:r>
           </a:p>
           <a:p>
             <a:pPr lvl="1"/>

</xml_diff>

<commit_message>
Added start guide updates from Ethan.
</commit_message>
<xml_diff>
--- a/start_guide.pptx
+++ b/start_guide.pptx
@@ -4,15 +4,26 @@
   <p:sldMasterIdLst>
     <p:sldMasterId id="2147483648" r:id="rId1"/>
   </p:sldMasterIdLst>
+  <p:notesMasterIdLst>
+    <p:notesMasterId r:id="rId18"/>
+  </p:notesMasterIdLst>
   <p:sldIdLst>
     <p:sldId id="256" r:id="rId2"/>
     <p:sldId id="257" r:id="rId3"/>
-    <p:sldId id="258" r:id="rId4"/>
-    <p:sldId id="259" r:id="rId5"/>
-    <p:sldId id="260" r:id="rId6"/>
-    <p:sldId id="261" r:id="rId7"/>
-    <p:sldId id="262" r:id="rId8"/>
-    <p:sldId id="263" r:id="rId9"/>
+    <p:sldId id="262" r:id="rId4"/>
+    <p:sldId id="258" r:id="rId5"/>
+    <p:sldId id="264" r:id="rId6"/>
+    <p:sldId id="265" r:id="rId7"/>
+    <p:sldId id="267" r:id="rId8"/>
+    <p:sldId id="268" r:id="rId9"/>
+    <p:sldId id="266" r:id="rId10"/>
+    <p:sldId id="269" r:id="rId11"/>
+    <p:sldId id="270" r:id="rId12"/>
+    <p:sldId id="271" r:id="rId13"/>
+    <p:sldId id="259" r:id="rId14"/>
+    <p:sldId id="260" r:id="rId15"/>
+    <p:sldId id="261" r:id="rId16"/>
+    <p:sldId id="263" r:id="rId17"/>
   </p:sldIdLst>
   <p:sldSz cx="12192000" cy="6858000"/>
   <p:notesSz cx="6858000" cy="9144000"/>
@@ -111,7 +122,445 @@
       </a:defRPr>
     </a:lvl9pPr>
   </p:defaultTextStyle>
+  <p:extLst>
+    <p:ext uri="{EFAFB233-063F-42B5-8137-9DF3F51BA10A}">
+      <p15:sldGuideLst xmlns:p15="http://schemas.microsoft.com/office/powerpoint/2012/main"/>
+    </p:ext>
+  </p:extLst>
 </p:presentation>
+</file>
+
+<file path=ppt/notesMasters/notesMaster1.xml><?xml version="1.0" encoding="utf-8"?>
+<p:notesMaster xmlns:a="http://schemas.openxmlformats.org/drawingml/2006/main" xmlns:r="http://schemas.openxmlformats.org/officeDocument/2006/relationships" xmlns:p="http://schemas.openxmlformats.org/presentationml/2006/main">
+  <p:cSld>
+    <p:bg>
+      <p:bgRef idx="1001">
+        <a:schemeClr val="bg1"/>
+      </p:bgRef>
+    </p:bg>
+    <p:spTree>
+      <p:nvGrpSpPr>
+        <p:cNvPr id="1" name=""/>
+        <p:cNvGrpSpPr/>
+        <p:nvPr/>
+      </p:nvGrpSpPr>
+      <p:grpSpPr>
+        <a:xfrm>
+          <a:off x="0" y="0"/>
+          <a:ext cx="0" cy="0"/>
+          <a:chOff x="0" y="0"/>
+          <a:chExt cx="0" cy="0"/>
+        </a:xfrm>
+      </p:grpSpPr>
+      <p:sp>
+        <p:nvSpPr>
+          <p:cNvPr id="2" name="Header Placeholder 1"/>
+          <p:cNvSpPr>
+            <a:spLocks noGrp="1"/>
+          </p:cNvSpPr>
+          <p:nvPr>
+            <p:ph type="hdr" sz="quarter"/>
+          </p:nvPr>
+        </p:nvSpPr>
+        <p:spPr>
+          <a:xfrm>
+            <a:off x="0" y="0"/>
+            <a:ext cx="2971800" cy="458788"/>
+          </a:xfrm>
+          <a:prstGeom prst="rect">
+            <a:avLst/>
+          </a:prstGeom>
+        </p:spPr>
+        <p:txBody>
+          <a:bodyPr vert="horz" lIns="91440" tIns="45720" rIns="91440" bIns="45720" rtlCol="0"/>
+          <a:lstStyle>
+            <a:lvl1pPr algn="l">
+              <a:defRPr sz="1200"/>
+            </a:lvl1pPr>
+          </a:lstStyle>
+          <a:p>
+            <a:endParaRPr lang="en-US"/>
+          </a:p>
+        </p:txBody>
+      </p:sp>
+      <p:sp>
+        <p:nvSpPr>
+          <p:cNvPr id="3" name="Date Placeholder 2"/>
+          <p:cNvSpPr>
+            <a:spLocks noGrp="1"/>
+          </p:cNvSpPr>
+          <p:nvPr>
+            <p:ph type="dt" idx="1"/>
+          </p:nvPr>
+        </p:nvSpPr>
+        <p:spPr>
+          <a:xfrm>
+            <a:off x="3884613" y="0"/>
+            <a:ext cx="2971800" cy="458788"/>
+          </a:xfrm>
+          <a:prstGeom prst="rect">
+            <a:avLst/>
+          </a:prstGeom>
+        </p:spPr>
+        <p:txBody>
+          <a:bodyPr vert="horz" lIns="91440" tIns="45720" rIns="91440" bIns="45720" rtlCol="0"/>
+          <a:lstStyle>
+            <a:lvl1pPr algn="r">
+              <a:defRPr sz="1200"/>
+            </a:lvl1pPr>
+          </a:lstStyle>
+          <a:p>
+            <a:fld id="{AC21377A-63E0-7E41-AB6F-64E8890DD1ED}" type="datetimeFigureOut">
+              <a:rPr lang="en-US" smtClean="0"/>
+              <a:t>11/15/2024</a:t>
+            </a:fld>
+            <a:endParaRPr lang="en-US"/>
+          </a:p>
+        </p:txBody>
+      </p:sp>
+      <p:sp>
+        <p:nvSpPr>
+          <p:cNvPr id="4" name="Slide Image Placeholder 3"/>
+          <p:cNvSpPr>
+            <a:spLocks noGrp="1" noRot="1" noChangeAspect="1"/>
+          </p:cNvSpPr>
+          <p:nvPr>
+            <p:ph type="sldImg" idx="2"/>
+          </p:nvPr>
+        </p:nvSpPr>
+        <p:spPr>
+          <a:xfrm>
+            <a:off x="685800" y="1143000"/>
+            <a:ext cx="5486400" cy="3086100"/>
+          </a:xfrm>
+          <a:prstGeom prst="rect">
+            <a:avLst/>
+          </a:prstGeom>
+          <a:noFill/>
+          <a:ln w="12700">
+            <a:solidFill>
+              <a:prstClr val="black"/>
+            </a:solidFill>
+          </a:ln>
+        </p:spPr>
+        <p:txBody>
+          <a:bodyPr vert="horz" lIns="91440" tIns="45720" rIns="91440" bIns="45720" rtlCol="0" anchor="ctr"/>
+          <a:lstStyle/>
+          <a:p>
+            <a:endParaRPr lang="en-US"/>
+          </a:p>
+        </p:txBody>
+      </p:sp>
+      <p:sp>
+        <p:nvSpPr>
+          <p:cNvPr id="5" name="Notes Placeholder 4"/>
+          <p:cNvSpPr>
+            <a:spLocks noGrp="1"/>
+          </p:cNvSpPr>
+          <p:nvPr>
+            <p:ph type="body" sz="quarter" idx="3"/>
+          </p:nvPr>
+        </p:nvSpPr>
+        <p:spPr>
+          <a:xfrm>
+            <a:off x="685800" y="4400550"/>
+            <a:ext cx="5486400" cy="3600450"/>
+          </a:xfrm>
+          <a:prstGeom prst="rect">
+            <a:avLst/>
+          </a:prstGeom>
+        </p:spPr>
+        <p:txBody>
+          <a:bodyPr vert="horz" lIns="91440" tIns="45720" rIns="91440" bIns="45720" rtlCol="0"/>
+          <a:lstStyle/>
+          <a:p>
+            <a:pPr lvl="0"/>
+            <a:r>
+              <a:rPr lang="en-US"/>
+              <a:t>Click to edit Master text styles</a:t>
+            </a:r>
+          </a:p>
+          <a:p>
+            <a:pPr lvl="1"/>
+            <a:r>
+              <a:rPr lang="en-US"/>
+              <a:t>Second level</a:t>
+            </a:r>
+          </a:p>
+          <a:p>
+            <a:pPr lvl="2"/>
+            <a:r>
+              <a:rPr lang="en-US"/>
+              <a:t>Third level</a:t>
+            </a:r>
+          </a:p>
+          <a:p>
+            <a:pPr lvl="3"/>
+            <a:r>
+              <a:rPr lang="en-US"/>
+              <a:t>Fourth level</a:t>
+            </a:r>
+          </a:p>
+          <a:p>
+            <a:pPr lvl="4"/>
+            <a:r>
+              <a:rPr lang="en-US"/>
+              <a:t>Fifth level</a:t>
+            </a:r>
+          </a:p>
+        </p:txBody>
+      </p:sp>
+      <p:sp>
+        <p:nvSpPr>
+          <p:cNvPr id="6" name="Footer Placeholder 5"/>
+          <p:cNvSpPr>
+            <a:spLocks noGrp="1"/>
+          </p:cNvSpPr>
+          <p:nvPr>
+            <p:ph type="ftr" sz="quarter" idx="4"/>
+          </p:nvPr>
+        </p:nvSpPr>
+        <p:spPr>
+          <a:xfrm>
+            <a:off x="0" y="8685213"/>
+            <a:ext cx="2971800" cy="458787"/>
+          </a:xfrm>
+          <a:prstGeom prst="rect">
+            <a:avLst/>
+          </a:prstGeom>
+        </p:spPr>
+        <p:txBody>
+          <a:bodyPr vert="horz" lIns="91440" tIns="45720" rIns="91440" bIns="45720" rtlCol="0" anchor="b"/>
+          <a:lstStyle>
+            <a:lvl1pPr algn="l">
+              <a:defRPr sz="1200"/>
+            </a:lvl1pPr>
+          </a:lstStyle>
+          <a:p>
+            <a:endParaRPr lang="en-US"/>
+          </a:p>
+        </p:txBody>
+      </p:sp>
+      <p:sp>
+        <p:nvSpPr>
+          <p:cNvPr id="7" name="Slide Number Placeholder 6"/>
+          <p:cNvSpPr>
+            <a:spLocks noGrp="1"/>
+          </p:cNvSpPr>
+          <p:nvPr>
+            <p:ph type="sldNum" sz="quarter" idx="5"/>
+          </p:nvPr>
+        </p:nvSpPr>
+        <p:spPr>
+          <a:xfrm>
+            <a:off x="3884613" y="8685213"/>
+            <a:ext cx="2971800" cy="458787"/>
+          </a:xfrm>
+          <a:prstGeom prst="rect">
+            <a:avLst/>
+          </a:prstGeom>
+        </p:spPr>
+        <p:txBody>
+          <a:bodyPr vert="horz" lIns="91440" tIns="45720" rIns="91440" bIns="45720" rtlCol="0" anchor="b"/>
+          <a:lstStyle>
+            <a:lvl1pPr algn="r">
+              <a:defRPr sz="1200"/>
+            </a:lvl1pPr>
+          </a:lstStyle>
+          <a:p>
+            <a:fld id="{12B557FA-C403-9E4F-A846-BEBC5C67AEB6}" type="slidenum">
+              <a:rPr lang="en-US" smtClean="0"/>
+              <a:t>‹#›</a:t>
+            </a:fld>
+            <a:endParaRPr lang="en-US"/>
+          </a:p>
+        </p:txBody>
+      </p:sp>
+    </p:spTree>
+    <p:extLst>
+      <p:ext uri="{BB962C8B-B14F-4D97-AF65-F5344CB8AC3E}">
+        <p14:creationId xmlns:p14="http://schemas.microsoft.com/office/powerpoint/2010/main" val="3733422947"/>
+      </p:ext>
+    </p:extLst>
+  </p:cSld>
+  <p:clrMap bg1="lt1" tx1="dk1" bg2="lt2" tx2="dk2" accent1="accent1" accent2="accent2" accent3="accent3" accent4="accent4" accent5="accent5" accent6="accent6" hlink="hlink" folHlink="folHlink"/>
+  <p:notesStyle>
+    <a:lvl1pPr marL="0" algn="l" defTabSz="914400" rtl="0" eaLnBrk="1" latinLnBrk="0" hangingPunct="1">
+      <a:defRPr sz="1200" kern="1200">
+        <a:solidFill>
+          <a:schemeClr val="tx1"/>
+        </a:solidFill>
+        <a:latin typeface="+mn-lt"/>
+        <a:ea typeface="+mn-ea"/>
+        <a:cs typeface="+mn-cs"/>
+      </a:defRPr>
+    </a:lvl1pPr>
+    <a:lvl2pPr marL="457200" algn="l" defTabSz="914400" rtl="0" eaLnBrk="1" latinLnBrk="0" hangingPunct="1">
+      <a:defRPr sz="1200" kern="1200">
+        <a:solidFill>
+          <a:schemeClr val="tx1"/>
+        </a:solidFill>
+        <a:latin typeface="+mn-lt"/>
+        <a:ea typeface="+mn-ea"/>
+        <a:cs typeface="+mn-cs"/>
+      </a:defRPr>
+    </a:lvl2pPr>
+    <a:lvl3pPr marL="914400" algn="l" defTabSz="914400" rtl="0" eaLnBrk="1" latinLnBrk="0" hangingPunct="1">
+      <a:defRPr sz="1200" kern="1200">
+        <a:solidFill>
+          <a:schemeClr val="tx1"/>
+        </a:solidFill>
+        <a:latin typeface="+mn-lt"/>
+        <a:ea typeface="+mn-ea"/>
+        <a:cs typeface="+mn-cs"/>
+      </a:defRPr>
+    </a:lvl3pPr>
+    <a:lvl4pPr marL="1371600" algn="l" defTabSz="914400" rtl="0" eaLnBrk="1" latinLnBrk="0" hangingPunct="1">
+      <a:defRPr sz="1200" kern="1200">
+        <a:solidFill>
+          <a:schemeClr val="tx1"/>
+        </a:solidFill>
+        <a:latin typeface="+mn-lt"/>
+        <a:ea typeface="+mn-ea"/>
+        <a:cs typeface="+mn-cs"/>
+      </a:defRPr>
+    </a:lvl4pPr>
+    <a:lvl5pPr marL="1828800" algn="l" defTabSz="914400" rtl="0" eaLnBrk="1" latinLnBrk="0" hangingPunct="1">
+      <a:defRPr sz="1200" kern="1200">
+        <a:solidFill>
+          <a:schemeClr val="tx1"/>
+        </a:solidFill>
+        <a:latin typeface="+mn-lt"/>
+        <a:ea typeface="+mn-ea"/>
+        <a:cs typeface="+mn-cs"/>
+      </a:defRPr>
+    </a:lvl5pPr>
+    <a:lvl6pPr marL="2286000" algn="l" defTabSz="914400" rtl="0" eaLnBrk="1" latinLnBrk="0" hangingPunct="1">
+      <a:defRPr sz="1200" kern="1200">
+        <a:solidFill>
+          <a:schemeClr val="tx1"/>
+        </a:solidFill>
+        <a:latin typeface="+mn-lt"/>
+        <a:ea typeface="+mn-ea"/>
+        <a:cs typeface="+mn-cs"/>
+      </a:defRPr>
+    </a:lvl6pPr>
+    <a:lvl7pPr marL="2743200" algn="l" defTabSz="914400" rtl="0" eaLnBrk="1" latinLnBrk="0" hangingPunct="1">
+      <a:defRPr sz="1200" kern="1200">
+        <a:solidFill>
+          <a:schemeClr val="tx1"/>
+        </a:solidFill>
+        <a:latin typeface="+mn-lt"/>
+        <a:ea typeface="+mn-ea"/>
+        <a:cs typeface="+mn-cs"/>
+      </a:defRPr>
+    </a:lvl7pPr>
+    <a:lvl8pPr marL="3200400" algn="l" defTabSz="914400" rtl="0" eaLnBrk="1" latinLnBrk="0" hangingPunct="1">
+      <a:defRPr sz="1200" kern="1200">
+        <a:solidFill>
+          <a:schemeClr val="tx1"/>
+        </a:solidFill>
+        <a:latin typeface="+mn-lt"/>
+        <a:ea typeface="+mn-ea"/>
+        <a:cs typeface="+mn-cs"/>
+      </a:defRPr>
+    </a:lvl8pPr>
+    <a:lvl9pPr marL="3657600" algn="l" defTabSz="914400" rtl="0" eaLnBrk="1" latinLnBrk="0" hangingPunct="1">
+      <a:defRPr sz="1200" kern="1200">
+        <a:solidFill>
+          <a:schemeClr val="tx1"/>
+        </a:solidFill>
+        <a:latin typeface="+mn-lt"/>
+        <a:ea typeface="+mn-ea"/>
+        <a:cs typeface="+mn-cs"/>
+      </a:defRPr>
+    </a:lvl9pPr>
+  </p:notesStyle>
+</p:notesMaster>
+</file>
+
+<file path=ppt/notesSlides/notesSlide1.xml><?xml version="1.0" encoding="utf-8"?>
+<p:notes xmlns:a="http://schemas.openxmlformats.org/drawingml/2006/main" xmlns:r="http://schemas.openxmlformats.org/officeDocument/2006/relationships" xmlns:p="http://schemas.openxmlformats.org/presentationml/2006/main">
+  <p:cSld>
+    <p:spTree>
+      <p:nvGrpSpPr>
+        <p:cNvPr id="1" name=""/>
+        <p:cNvGrpSpPr/>
+        <p:nvPr/>
+      </p:nvGrpSpPr>
+      <p:grpSpPr>
+        <a:xfrm>
+          <a:off x="0" y="0"/>
+          <a:ext cx="0" cy="0"/>
+          <a:chOff x="0" y="0"/>
+          <a:chExt cx="0" cy="0"/>
+        </a:xfrm>
+      </p:grpSpPr>
+      <p:sp>
+        <p:nvSpPr>
+          <p:cNvPr id="2" name="Slide Image Placeholder 1"/>
+          <p:cNvSpPr>
+            <a:spLocks noGrp="1" noRot="1" noChangeAspect="1"/>
+          </p:cNvSpPr>
+          <p:nvPr>
+            <p:ph type="sldImg"/>
+          </p:nvPr>
+        </p:nvSpPr>
+        <p:spPr/>
+      </p:sp>
+      <p:sp>
+        <p:nvSpPr>
+          <p:cNvPr id="3" name="Notes Placeholder 2"/>
+          <p:cNvSpPr>
+            <a:spLocks noGrp="1"/>
+          </p:cNvSpPr>
+          <p:nvPr>
+            <p:ph type="body" idx="1"/>
+          </p:nvPr>
+        </p:nvSpPr>
+        <p:spPr/>
+        <p:txBody>
+          <a:bodyPr/>
+          <a:lstStyle/>
+          <a:p>
+            <a:endParaRPr lang="en-US" dirty="0"/>
+          </a:p>
+        </p:txBody>
+      </p:sp>
+      <p:sp>
+        <p:nvSpPr>
+          <p:cNvPr id="4" name="Slide Number Placeholder 3"/>
+          <p:cNvSpPr>
+            <a:spLocks noGrp="1"/>
+          </p:cNvSpPr>
+          <p:nvPr>
+            <p:ph type="sldNum" sz="quarter" idx="5"/>
+          </p:nvPr>
+        </p:nvSpPr>
+        <p:spPr/>
+        <p:txBody>
+          <a:bodyPr/>
+          <a:lstStyle/>
+          <a:p>
+            <a:fld id="{12B557FA-C403-9E4F-A846-BEBC5C67AEB6}" type="slidenum">
+              <a:rPr lang="en-US" smtClean="0"/>
+              <a:t>8</a:t>
+            </a:fld>
+            <a:endParaRPr lang="en-US"/>
+          </a:p>
+        </p:txBody>
+      </p:sp>
+    </p:spTree>
+    <p:extLst>
+      <p:ext uri="{BB962C8B-B14F-4D97-AF65-F5344CB8AC3E}">
+        <p14:creationId xmlns:p14="http://schemas.microsoft.com/office/powerpoint/2010/main" val="1531506220"/>
+      </p:ext>
+    </p:extLst>
+  </p:cSld>
+  <p:clrMapOvr>
+    <a:masterClrMapping/>
+  </p:clrMapOvr>
+</p:notes>
 </file>
 
 <file path=ppt/slideLayouts/slideLayout1.xml><?xml version="1.0" encoding="utf-8"?>
@@ -261,7 +710,7 @@
           <a:p>
             <a:fld id="{9B59D91B-E64C-4044-B155-C0DCA1A388C1}" type="datetimeFigureOut">
               <a:rPr lang="en-US" smtClean="0"/>
-              <a:t>11/14/2024</a:t>
+              <a:t>11/15/2024</a:t>
             </a:fld>
             <a:endParaRPr lang="en-US"/>
           </a:p>
@@ -459,7 +908,7 @@
           <a:p>
             <a:fld id="{9B59D91B-E64C-4044-B155-C0DCA1A388C1}" type="datetimeFigureOut">
               <a:rPr lang="en-US" smtClean="0"/>
-              <a:t>11/14/2024</a:t>
+              <a:t>11/15/2024</a:t>
             </a:fld>
             <a:endParaRPr lang="en-US"/>
           </a:p>
@@ -667,7 +1116,7 @@
           <a:p>
             <a:fld id="{9B59D91B-E64C-4044-B155-C0DCA1A388C1}" type="datetimeFigureOut">
               <a:rPr lang="en-US" smtClean="0"/>
-              <a:t>11/14/2024</a:t>
+              <a:t>11/15/2024</a:t>
             </a:fld>
             <a:endParaRPr lang="en-US"/>
           </a:p>
@@ -865,7 +1314,7 @@
           <a:p>
             <a:fld id="{9B59D91B-E64C-4044-B155-C0DCA1A388C1}" type="datetimeFigureOut">
               <a:rPr lang="en-US" smtClean="0"/>
-              <a:t>11/14/2024</a:t>
+              <a:t>11/15/2024</a:t>
             </a:fld>
             <a:endParaRPr lang="en-US"/>
           </a:p>
@@ -1140,7 +1589,7 @@
           <a:p>
             <a:fld id="{9B59D91B-E64C-4044-B155-C0DCA1A388C1}" type="datetimeFigureOut">
               <a:rPr lang="en-US" smtClean="0"/>
-              <a:t>11/14/2024</a:t>
+              <a:t>11/15/2024</a:t>
             </a:fld>
             <a:endParaRPr lang="en-US"/>
           </a:p>
@@ -1405,7 +1854,7 @@
           <a:p>
             <a:fld id="{9B59D91B-E64C-4044-B155-C0DCA1A388C1}" type="datetimeFigureOut">
               <a:rPr lang="en-US" smtClean="0"/>
-              <a:t>11/14/2024</a:t>
+              <a:t>11/15/2024</a:t>
             </a:fld>
             <a:endParaRPr lang="en-US"/>
           </a:p>
@@ -1817,7 +2266,7 @@
           <a:p>
             <a:fld id="{9B59D91B-E64C-4044-B155-C0DCA1A388C1}" type="datetimeFigureOut">
               <a:rPr lang="en-US" smtClean="0"/>
-              <a:t>11/14/2024</a:t>
+              <a:t>11/15/2024</a:t>
             </a:fld>
             <a:endParaRPr lang="en-US"/>
           </a:p>
@@ -1958,7 +2407,7 @@
           <a:p>
             <a:fld id="{9B59D91B-E64C-4044-B155-C0DCA1A388C1}" type="datetimeFigureOut">
               <a:rPr lang="en-US" smtClean="0"/>
-              <a:t>11/14/2024</a:t>
+              <a:t>11/15/2024</a:t>
             </a:fld>
             <a:endParaRPr lang="en-US"/>
           </a:p>
@@ -2071,7 +2520,7 @@
           <a:p>
             <a:fld id="{9B59D91B-E64C-4044-B155-C0DCA1A388C1}" type="datetimeFigureOut">
               <a:rPr lang="en-US" smtClean="0"/>
-              <a:t>11/14/2024</a:t>
+              <a:t>11/15/2024</a:t>
             </a:fld>
             <a:endParaRPr lang="en-US"/>
           </a:p>
@@ -2382,7 +2831,7 @@
           <a:p>
             <a:fld id="{9B59D91B-E64C-4044-B155-C0DCA1A388C1}" type="datetimeFigureOut">
               <a:rPr lang="en-US" smtClean="0"/>
-              <a:t>11/14/2024</a:t>
+              <a:t>11/15/2024</a:t>
             </a:fld>
             <a:endParaRPr lang="en-US"/>
           </a:p>
@@ -2670,7 +3119,7 @@
           <a:p>
             <a:fld id="{9B59D91B-E64C-4044-B155-C0DCA1A388C1}" type="datetimeFigureOut">
               <a:rPr lang="en-US" smtClean="0"/>
-              <a:t>11/14/2024</a:t>
+              <a:t>11/15/2024</a:t>
             </a:fld>
             <a:endParaRPr lang="en-US"/>
           </a:p>
@@ -2911,7 +3360,7 @@
           <a:p>
             <a:fld id="{9B59D91B-E64C-4044-B155-C0DCA1A388C1}" type="datetimeFigureOut">
               <a:rPr lang="en-US" smtClean="0"/>
-              <a:t>11/14/2024</a:t>
+              <a:t>11/15/2024</a:t>
             </a:fld>
             <a:endParaRPr lang="en-US"/>
           </a:p>
@@ -3412,7 +3861,609 @@
 </p:sld>
 </file>
 
-<file path=ppt/slides/slide2.xml><?xml version="1.0" encoding="utf-8"?>
+<file path=ppt/slides/slide10.xml><?xml version="1.0" encoding="utf-8"?>
+<p:sld xmlns:a="http://schemas.openxmlformats.org/drawingml/2006/main" xmlns:r="http://schemas.openxmlformats.org/officeDocument/2006/relationships" xmlns:p="http://schemas.openxmlformats.org/presentationml/2006/main">
+  <p:cSld>
+    <p:spTree>
+      <p:nvGrpSpPr>
+        <p:cNvPr id="1" name="">
+          <a:extLst>
+            <a:ext uri="{FF2B5EF4-FFF2-40B4-BE49-F238E27FC236}">
+              <a16:creationId xmlns:a16="http://schemas.microsoft.com/office/drawing/2014/main" id="{025D88C9-0CCD-CDED-7E52-5B7EC005D13B}"/>
+            </a:ext>
+          </a:extLst>
+        </p:cNvPr>
+        <p:cNvGrpSpPr/>
+        <p:nvPr/>
+      </p:nvGrpSpPr>
+      <p:grpSpPr>
+        <a:xfrm>
+          <a:off x="0" y="0"/>
+          <a:ext cx="0" cy="0"/>
+          <a:chOff x="0" y="0"/>
+          <a:chExt cx="0" cy="0"/>
+        </a:xfrm>
+      </p:grpSpPr>
+      <p:sp>
+        <p:nvSpPr>
+          <p:cNvPr id="2" name="Title 1">
+            <a:extLst>
+              <a:ext uri="{FF2B5EF4-FFF2-40B4-BE49-F238E27FC236}">
+                <a16:creationId xmlns:a16="http://schemas.microsoft.com/office/drawing/2014/main" id="{BA357F26-7F3C-46D5-E7A0-BF51DCD29E4A}"/>
+              </a:ext>
+            </a:extLst>
+          </p:cNvPr>
+          <p:cNvSpPr>
+            <a:spLocks noGrp="1"/>
+          </p:cNvSpPr>
+          <p:nvPr>
+            <p:ph type="title"/>
+          </p:nvPr>
+        </p:nvSpPr>
+        <p:spPr/>
+        <p:txBody>
+          <a:bodyPr/>
+          <a:lstStyle/>
+          <a:p>
+            <a:r>
+              <a:rPr lang="en-US" dirty="0"/>
+              <a:t>Aside: Full procedure for making safe edits to </a:t>
+            </a:r>
+            <a:r>
+              <a:rPr lang="en-US" dirty="0" err="1"/>
+              <a:t>common_code</a:t>
+            </a:r>
+            <a:endParaRPr lang="en-US" dirty="0"/>
+          </a:p>
+        </p:txBody>
+      </p:sp>
+      <p:sp>
+        <p:nvSpPr>
+          <p:cNvPr id="3" name="Content Placeholder 2">
+            <a:extLst>
+              <a:ext uri="{FF2B5EF4-FFF2-40B4-BE49-F238E27FC236}">
+                <a16:creationId xmlns:a16="http://schemas.microsoft.com/office/drawing/2014/main" id="{838B624F-FE3E-6C4D-531D-792EA9A4D540}"/>
+              </a:ext>
+            </a:extLst>
+          </p:cNvPr>
+          <p:cNvSpPr>
+            <a:spLocks noGrp="1"/>
+          </p:cNvSpPr>
+          <p:nvPr>
+            <p:ph idx="1"/>
+          </p:nvPr>
+        </p:nvSpPr>
+        <p:spPr/>
+        <p:txBody>
+          <a:bodyPr>
+            <a:normAutofit/>
+          </a:bodyPr>
+          <a:lstStyle/>
+          <a:p>
+            <a:r>
+              <a:rPr lang="en-US" dirty="0"/>
+              <a:t>As an example, I’ve recently made a couple edits to two scripts in a branch I opened called “</a:t>
+            </a:r>
+            <a:r>
+              <a:rPr lang="en-US" b="1" dirty="0" err="1"/>
+              <a:t>edit_linemaker_and_rescale_factors</a:t>
+            </a:r>
+            <a:r>
+              <a:rPr lang="en-US" dirty="0"/>
+              <a:t>”</a:t>
+            </a:r>
+          </a:p>
+          <a:p>
+            <a:r>
+              <a:rPr lang="en-US" dirty="0"/>
+              <a:t>I have </a:t>
+            </a:r>
+            <a:r>
+              <a:rPr lang="en-US" b="1" dirty="0"/>
+              <a:t>committed </a:t>
+            </a:r>
+            <a:r>
+              <a:rPr lang="en-US" dirty="0"/>
+              <a:t>my changes to Git (updated the local repository) and </a:t>
+            </a:r>
+            <a:r>
+              <a:rPr lang="en-US" b="1" dirty="0"/>
+              <a:t>pushed</a:t>
+            </a:r>
+            <a:r>
+              <a:rPr lang="en-US" dirty="0"/>
+              <a:t> this branch (upload to </a:t>
+            </a:r>
+            <a:r>
+              <a:rPr lang="en-US" dirty="0" err="1"/>
+              <a:t>github</a:t>
+            </a:r>
+            <a:r>
+              <a:rPr lang="en-US" dirty="0"/>
+              <a:t>), so that now I have two branches in my forked version of </a:t>
+            </a:r>
+            <a:r>
+              <a:rPr lang="en-US" dirty="0" err="1"/>
+              <a:t>common_code</a:t>
+            </a:r>
+            <a:r>
+              <a:rPr lang="en-US" dirty="0"/>
+              <a:t>:</a:t>
+            </a:r>
+          </a:p>
+        </p:txBody>
+      </p:sp>
+      <p:pic>
+        <p:nvPicPr>
+          <p:cNvPr id="4" name="Picture 3">
+            <a:extLst>
+              <a:ext uri="{FF2B5EF4-FFF2-40B4-BE49-F238E27FC236}">
+                <a16:creationId xmlns:a16="http://schemas.microsoft.com/office/drawing/2014/main" id="{354FBDD2-7768-6047-240C-B09AC7DC1A5B}"/>
+              </a:ext>
+            </a:extLst>
+          </p:cNvPr>
+          <p:cNvPicPr>
+            <a:picLocks noChangeAspect="1"/>
+          </p:cNvPicPr>
+          <p:nvPr/>
+        </p:nvPicPr>
+        <p:blipFill>
+          <a:blip r:embed="rId2"/>
+          <a:stretch>
+            <a:fillRect/>
+          </a:stretch>
+        </p:blipFill>
+        <p:spPr>
+          <a:xfrm>
+            <a:off x="4419600" y="4001294"/>
+            <a:ext cx="7772400" cy="2771595"/>
+          </a:xfrm>
+          <a:prstGeom prst="rect">
+            <a:avLst/>
+          </a:prstGeom>
+        </p:spPr>
+      </p:pic>
+      <p:sp>
+        <p:nvSpPr>
+          <p:cNvPr id="5" name="Rectangle 4">
+            <a:extLst>
+              <a:ext uri="{FF2B5EF4-FFF2-40B4-BE49-F238E27FC236}">
+                <a16:creationId xmlns:a16="http://schemas.microsoft.com/office/drawing/2014/main" id="{364F24C9-65B5-A676-D7ED-8B15C8491E03}"/>
+              </a:ext>
+            </a:extLst>
+          </p:cNvPr>
+          <p:cNvSpPr/>
+          <p:nvPr/>
+        </p:nvSpPr>
+        <p:spPr>
+          <a:xfrm>
+            <a:off x="4943475" y="5100638"/>
+            <a:ext cx="1843088" cy="1757362"/>
+          </a:xfrm>
+          <a:prstGeom prst="rect">
+            <a:avLst/>
+          </a:prstGeom>
+          <a:noFill/>
+          <a:ln>
+            <a:solidFill>
+              <a:srgbClr val="FF0000"/>
+            </a:solidFill>
+          </a:ln>
+        </p:spPr>
+        <p:style>
+          <a:lnRef idx="2">
+            <a:schemeClr val="accent1">
+              <a:shade val="15000"/>
+            </a:schemeClr>
+          </a:lnRef>
+          <a:fillRef idx="1">
+            <a:schemeClr val="accent1"/>
+          </a:fillRef>
+          <a:effectRef idx="0">
+            <a:schemeClr val="accent1"/>
+          </a:effectRef>
+          <a:fontRef idx="minor">
+            <a:schemeClr val="lt1"/>
+          </a:fontRef>
+        </p:style>
+        <p:txBody>
+          <a:bodyPr rtlCol="0" anchor="ctr"/>
+          <a:lstStyle/>
+          <a:p>
+            <a:pPr algn="ctr"/>
+            <a:endParaRPr lang="en-US"/>
+          </a:p>
+        </p:txBody>
+      </p:sp>
+      <p:sp>
+        <p:nvSpPr>
+          <p:cNvPr id="7" name="TextBox 6">
+            <a:extLst>
+              <a:ext uri="{FF2B5EF4-FFF2-40B4-BE49-F238E27FC236}">
+                <a16:creationId xmlns:a16="http://schemas.microsoft.com/office/drawing/2014/main" id="{65946A9D-8F50-4454-6E86-86FED9D7CC67}"/>
+              </a:ext>
+            </a:extLst>
+          </p:cNvPr>
+          <p:cNvSpPr txBox="1"/>
+          <p:nvPr/>
+        </p:nvSpPr>
+        <p:spPr>
+          <a:xfrm>
+            <a:off x="434898" y="4594302"/>
+            <a:ext cx="3523785" cy="923330"/>
+          </a:xfrm>
+          <a:prstGeom prst="rect">
+            <a:avLst/>
+          </a:prstGeom>
+          <a:noFill/>
+          <a:ln w="28575">
+            <a:solidFill>
+              <a:srgbClr val="FF0000"/>
+            </a:solidFill>
+          </a:ln>
+        </p:spPr>
+        <p:txBody>
+          <a:bodyPr wrap="square" rtlCol="0">
+            <a:spAutoFit/>
+          </a:bodyPr>
+          <a:lstStyle/>
+          <a:p>
+            <a:r>
+              <a:rPr lang="en-US" b="1" i="1" dirty="0">
+                <a:solidFill>
+                  <a:srgbClr val="FF0000"/>
+                </a:solidFill>
+              </a:rPr>
+              <a:t>Currently my “main” branch is in sync with the original version of </a:t>
+            </a:r>
+            <a:r>
+              <a:rPr lang="en-US" b="1" i="1" dirty="0" err="1">
+                <a:solidFill>
+                  <a:srgbClr val="FF0000"/>
+                </a:solidFill>
+              </a:rPr>
+              <a:t>common_code</a:t>
+            </a:r>
+            <a:endParaRPr lang="en-US" b="1" i="1" dirty="0">
+              <a:solidFill>
+                <a:srgbClr val="FF0000"/>
+              </a:solidFill>
+            </a:endParaRPr>
+          </a:p>
+        </p:txBody>
+      </p:sp>
+    </p:spTree>
+    <p:extLst>
+      <p:ext uri="{BB962C8B-B14F-4D97-AF65-F5344CB8AC3E}">
+        <p14:creationId xmlns:p14="http://schemas.microsoft.com/office/powerpoint/2010/main" val="2619491049"/>
+      </p:ext>
+    </p:extLst>
+  </p:cSld>
+  <p:clrMapOvr>
+    <a:masterClrMapping/>
+  </p:clrMapOvr>
+</p:sld>
+</file>
+
+<file path=ppt/slides/slide11.xml><?xml version="1.0" encoding="utf-8"?>
+<p:sld xmlns:a="http://schemas.openxmlformats.org/drawingml/2006/main" xmlns:r="http://schemas.openxmlformats.org/officeDocument/2006/relationships" xmlns:p="http://schemas.openxmlformats.org/presentationml/2006/main">
+  <p:cSld>
+    <p:spTree>
+      <p:nvGrpSpPr>
+        <p:cNvPr id="1" name="">
+          <a:extLst>
+            <a:ext uri="{FF2B5EF4-FFF2-40B4-BE49-F238E27FC236}">
+              <a16:creationId xmlns:a16="http://schemas.microsoft.com/office/drawing/2014/main" id="{CD1B3F8E-DDA9-E3EF-6F68-ABF187A29CB0}"/>
+            </a:ext>
+          </a:extLst>
+        </p:cNvPr>
+        <p:cNvGrpSpPr/>
+        <p:nvPr/>
+      </p:nvGrpSpPr>
+      <p:grpSpPr>
+        <a:xfrm>
+          <a:off x="0" y="0"/>
+          <a:ext cx="0" cy="0"/>
+          <a:chOff x="0" y="0"/>
+          <a:chExt cx="0" cy="0"/>
+        </a:xfrm>
+      </p:grpSpPr>
+      <p:sp>
+        <p:nvSpPr>
+          <p:cNvPr id="2" name="Title 1">
+            <a:extLst>
+              <a:ext uri="{FF2B5EF4-FFF2-40B4-BE49-F238E27FC236}">
+                <a16:creationId xmlns:a16="http://schemas.microsoft.com/office/drawing/2014/main" id="{0312EDEB-0D76-F778-4802-FC8403857628}"/>
+              </a:ext>
+            </a:extLst>
+          </p:cNvPr>
+          <p:cNvSpPr>
+            <a:spLocks noGrp="1"/>
+          </p:cNvSpPr>
+          <p:nvPr>
+            <p:ph type="title"/>
+          </p:nvPr>
+        </p:nvSpPr>
+        <p:spPr/>
+        <p:txBody>
+          <a:bodyPr/>
+          <a:lstStyle/>
+          <a:p>
+            <a:r>
+              <a:rPr lang="en-US" dirty="0"/>
+              <a:t>Aside: Full procedure for making safe edits to </a:t>
+            </a:r>
+            <a:r>
+              <a:rPr lang="en-US" dirty="0" err="1"/>
+              <a:t>common_code</a:t>
+            </a:r>
+            <a:endParaRPr lang="en-US" dirty="0"/>
+          </a:p>
+        </p:txBody>
+      </p:sp>
+      <p:sp>
+        <p:nvSpPr>
+          <p:cNvPr id="3" name="Content Placeholder 2">
+            <a:extLst>
+              <a:ext uri="{FF2B5EF4-FFF2-40B4-BE49-F238E27FC236}">
+                <a16:creationId xmlns:a16="http://schemas.microsoft.com/office/drawing/2014/main" id="{2E72D189-00EB-B394-E6D9-9A90FD4D6D69}"/>
+              </a:ext>
+            </a:extLst>
+          </p:cNvPr>
+          <p:cNvSpPr>
+            <a:spLocks noGrp="1"/>
+          </p:cNvSpPr>
+          <p:nvPr>
+            <p:ph idx="1"/>
+          </p:nvPr>
+        </p:nvSpPr>
+        <p:spPr/>
+        <p:txBody>
+          <a:bodyPr>
+            <a:normAutofit/>
+          </a:bodyPr>
+          <a:lstStyle/>
+          <a:p>
+            <a:r>
+              <a:rPr lang="en-US" dirty="0"/>
+              <a:t>Now if I switch to this branch I made for my edits, you can see that my code is now slightly different from that in the original repo:</a:t>
+            </a:r>
+          </a:p>
+        </p:txBody>
+      </p:sp>
+      <p:pic>
+        <p:nvPicPr>
+          <p:cNvPr id="6" name="Picture 5">
+            <a:extLst>
+              <a:ext uri="{FF2B5EF4-FFF2-40B4-BE49-F238E27FC236}">
+                <a16:creationId xmlns:a16="http://schemas.microsoft.com/office/drawing/2014/main" id="{99FEE391-7911-9B80-CE52-4121C6A85A42}"/>
+              </a:ext>
+            </a:extLst>
+          </p:cNvPr>
+          <p:cNvPicPr>
+            <a:picLocks noChangeAspect="1"/>
+          </p:cNvPicPr>
+          <p:nvPr/>
+        </p:nvPicPr>
+        <p:blipFill>
+          <a:blip r:embed="rId2"/>
+          <a:stretch>
+            <a:fillRect/>
+          </a:stretch>
+        </p:blipFill>
+        <p:spPr>
+          <a:xfrm>
+            <a:off x="994739" y="3219837"/>
+            <a:ext cx="10202522" cy="3638163"/>
+          </a:xfrm>
+          <a:prstGeom prst="rect">
+            <a:avLst/>
+          </a:prstGeom>
+        </p:spPr>
+      </p:pic>
+      <p:sp>
+        <p:nvSpPr>
+          <p:cNvPr id="8" name="Rectangle 7">
+            <a:extLst>
+              <a:ext uri="{FF2B5EF4-FFF2-40B4-BE49-F238E27FC236}">
+                <a16:creationId xmlns:a16="http://schemas.microsoft.com/office/drawing/2014/main" id="{4A087717-0BED-99E9-79CB-3417A66B58F5}"/>
+              </a:ext>
+            </a:extLst>
+          </p:cNvPr>
+          <p:cNvSpPr/>
+          <p:nvPr/>
+        </p:nvSpPr>
+        <p:spPr>
+          <a:xfrm>
+            <a:off x="1698470" y="4554538"/>
+            <a:ext cx="6497675" cy="931862"/>
+          </a:xfrm>
+          <a:prstGeom prst="rect">
+            <a:avLst/>
+          </a:prstGeom>
+          <a:noFill/>
+          <a:ln>
+            <a:solidFill>
+              <a:srgbClr val="FF0000"/>
+            </a:solidFill>
+          </a:ln>
+        </p:spPr>
+        <p:style>
+          <a:lnRef idx="2">
+            <a:schemeClr val="accent1">
+              <a:shade val="15000"/>
+            </a:schemeClr>
+          </a:lnRef>
+          <a:fillRef idx="1">
+            <a:schemeClr val="accent1"/>
+          </a:fillRef>
+          <a:effectRef idx="0">
+            <a:schemeClr val="accent1"/>
+          </a:effectRef>
+          <a:fontRef idx="minor">
+            <a:schemeClr val="lt1"/>
+          </a:fontRef>
+        </p:style>
+        <p:txBody>
+          <a:bodyPr rtlCol="0" anchor="ctr"/>
+          <a:lstStyle/>
+          <a:p>
+            <a:pPr algn="ctr"/>
+            <a:endParaRPr lang="en-US"/>
+          </a:p>
+        </p:txBody>
+      </p:sp>
+    </p:spTree>
+    <p:extLst>
+      <p:ext uri="{BB962C8B-B14F-4D97-AF65-F5344CB8AC3E}">
+        <p14:creationId xmlns:p14="http://schemas.microsoft.com/office/powerpoint/2010/main" val="923347148"/>
+      </p:ext>
+    </p:extLst>
+  </p:cSld>
+  <p:clrMapOvr>
+    <a:masterClrMapping/>
+  </p:clrMapOvr>
+</p:sld>
+</file>
+
+<file path=ppt/slides/slide12.xml><?xml version="1.0" encoding="utf-8"?>
+<p:sld xmlns:a="http://schemas.openxmlformats.org/drawingml/2006/main" xmlns:r="http://schemas.openxmlformats.org/officeDocument/2006/relationships" xmlns:p="http://schemas.openxmlformats.org/presentationml/2006/main">
+  <p:cSld>
+    <p:spTree>
+      <p:nvGrpSpPr>
+        <p:cNvPr id="1" name="">
+          <a:extLst>
+            <a:ext uri="{FF2B5EF4-FFF2-40B4-BE49-F238E27FC236}">
+              <a16:creationId xmlns:a16="http://schemas.microsoft.com/office/drawing/2014/main" id="{7702E5B6-0CB6-1D3E-FE66-45597E25F16F}"/>
+            </a:ext>
+          </a:extLst>
+        </p:cNvPr>
+        <p:cNvGrpSpPr/>
+        <p:nvPr/>
+      </p:nvGrpSpPr>
+      <p:grpSpPr>
+        <a:xfrm>
+          <a:off x="0" y="0"/>
+          <a:ext cx="0" cy="0"/>
+          <a:chOff x="0" y="0"/>
+          <a:chExt cx="0" cy="0"/>
+        </a:xfrm>
+      </p:grpSpPr>
+      <p:sp>
+        <p:nvSpPr>
+          <p:cNvPr id="2" name="Title 1">
+            <a:extLst>
+              <a:ext uri="{FF2B5EF4-FFF2-40B4-BE49-F238E27FC236}">
+                <a16:creationId xmlns:a16="http://schemas.microsoft.com/office/drawing/2014/main" id="{FE4719A4-73CC-6ABC-6EBA-A14FE6982B2B}"/>
+              </a:ext>
+            </a:extLst>
+          </p:cNvPr>
+          <p:cNvSpPr>
+            <a:spLocks noGrp="1"/>
+          </p:cNvSpPr>
+          <p:nvPr>
+            <p:ph type="title"/>
+          </p:nvPr>
+        </p:nvSpPr>
+        <p:spPr/>
+        <p:txBody>
+          <a:bodyPr/>
+          <a:lstStyle/>
+          <a:p>
+            <a:r>
+              <a:rPr lang="en-US" dirty="0"/>
+              <a:t>Aside: Full procedure for making safe edits to </a:t>
+            </a:r>
+            <a:r>
+              <a:rPr lang="en-US" dirty="0" err="1"/>
+              <a:t>common_code</a:t>
+            </a:r>
+            <a:endParaRPr lang="en-US" dirty="0"/>
+          </a:p>
+        </p:txBody>
+      </p:sp>
+      <p:sp>
+        <p:nvSpPr>
+          <p:cNvPr id="3" name="Content Placeholder 2">
+            <a:extLst>
+              <a:ext uri="{FF2B5EF4-FFF2-40B4-BE49-F238E27FC236}">
+                <a16:creationId xmlns:a16="http://schemas.microsoft.com/office/drawing/2014/main" id="{478CD4C4-E804-20C4-C7FF-6394544D4ACE}"/>
+              </a:ext>
+            </a:extLst>
+          </p:cNvPr>
+          <p:cNvSpPr>
+            <a:spLocks noGrp="1"/>
+          </p:cNvSpPr>
+          <p:nvPr>
+            <p:ph idx="1"/>
+          </p:nvPr>
+        </p:nvSpPr>
+        <p:spPr/>
+        <p:txBody>
+          <a:bodyPr>
+            <a:normAutofit/>
+          </a:bodyPr>
+          <a:lstStyle/>
+          <a:p>
+            <a:r>
+              <a:rPr lang="en-US" dirty="0"/>
+              <a:t>I have submitted a </a:t>
+            </a:r>
+            <a:r>
+              <a:rPr lang="en-US" b="1" dirty="0"/>
+              <a:t>pull request</a:t>
+            </a:r>
+            <a:r>
+              <a:rPr lang="en-US" dirty="0"/>
+              <a:t> to Jordan for him to implement these changes I have made, which I can check by going to the original repo:</a:t>
+            </a:r>
+          </a:p>
+        </p:txBody>
+      </p:sp>
+      <p:pic>
+        <p:nvPicPr>
+          <p:cNvPr id="4" name="Picture 3">
+            <a:extLst>
+              <a:ext uri="{FF2B5EF4-FFF2-40B4-BE49-F238E27FC236}">
+                <a16:creationId xmlns:a16="http://schemas.microsoft.com/office/drawing/2014/main" id="{45CA3D65-9D1B-A2A0-74C1-0E0C01878D16}"/>
+              </a:ext>
+            </a:extLst>
+          </p:cNvPr>
+          <p:cNvPicPr>
+            <a:picLocks noChangeAspect="1"/>
+          </p:cNvPicPr>
+          <p:nvPr/>
+        </p:nvPicPr>
+        <p:blipFill>
+          <a:blip r:embed="rId2"/>
+          <a:stretch>
+            <a:fillRect/>
+          </a:stretch>
+        </p:blipFill>
+        <p:spPr>
+          <a:xfrm>
+            <a:off x="1158659" y="3336743"/>
+            <a:ext cx="9874682" cy="3521257"/>
+          </a:xfrm>
+          <a:prstGeom prst="rect">
+            <a:avLst/>
+          </a:prstGeom>
+        </p:spPr>
+      </p:pic>
+    </p:spTree>
+    <p:extLst>
+      <p:ext uri="{BB962C8B-B14F-4D97-AF65-F5344CB8AC3E}">
+        <p14:creationId xmlns:p14="http://schemas.microsoft.com/office/powerpoint/2010/main" val="217753337"/>
+      </p:ext>
+    </p:extLst>
+  </p:cSld>
+  <p:clrMapOvr>
+    <a:masterClrMapping/>
+  </p:clrMapOvr>
+</p:sld>
+</file>
+
+<file path=ppt/slides/slide13.xml><?xml version="1.0" encoding="utf-8"?>
 <p:sld xmlns:a="http://schemas.openxmlformats.org/drawingml/2006/main" xmlns:r="http://schemas.openxmlformats.org/officeDocument/2006/relationships" xmlns:p="http://schemas.openxmlformats.org/presentationml/2006/main">
   <p:cSld>
     <p:spTree>
@@ -3434,7 +4485,7 @@
           <p:cNvPr id="2" name="Title 1">
             <a:extLst>
               <a:ext uri="{FF2B5EF4-FFF2-40B4-BE49-F238E27FC236}">
-                <a16:creationId xmlns:a16="http://schemas.microsoft.com/office/drawing/2014/main" id="{5152730C-A289-F15E-38CF-D4A137745615}"/>
+                <a16:creationId xmlns:a16="http://schemas.microsoft.com/office/drawing/2014/main" id="{2C420FD3-2B95-5657-C381-B2626B44C8F2}"/>
               </a:ext>
             </a:extLst>
           </p:cNvPr>
@@ -3452,350 +4503,7 @@
           <a:p>
             <a:r>
               <a:rPr lang="en-US" dirty="0"/>
-              <a:t>Summary</a:t>
-            </a:r>
-          </a:p>
-        </p:txBody>
-      </p:sp>
-      <p:sp>
-        <p:nvSpPr>
-          <p:cNvPr id="3" name="Content Placeholder 2">
-            <a:extLst>
-              <a:ext uri="{FF2B5EF4-FFF2-40B4-BE49-F238E27FC236}">
-                <a16:creationId xmlns:a16="http://schemas.microsoft.com/office/drawing/2014/main" id="{81545EF6-CA95-CD5E-DE8A-7F73B569B150}"/>
-              </a:ext>
-            </a:extLst>
-          </p:cNvPr>
-          <p:cNvSpPr>
-            <a:spLocks noGrp="1"/>
-          </p:cNvSpPr>
-          <p:nvPr>
-            <p:ph idx="1"/>
-          </p:nvPr>
-        </p:nvSpPr>
-        <p:spPr/>
-        <p:txBody>
-          <a:bodyPr/>
-          <a:lstStyle/>
-          <a:p>
-            <a:r>
-              <a:rPr lang="en-US" dirty="0" err="1"/>
-              <a:t>Common_code</a:t>
-            </a:r>
-            <a:r>
-              <a:rPr lang="en-US" dirty="0"/>
-              <a:t> is a repository of commonly used functions for the </a:t>
-            </a:r>
-            <a:r>
-              <a:rPr lang="en-US" dirty="0" err="1"/>
-              <a:t>Dahmen</a:t>
-            </a:r>
-            <a:r>
-              <a:rPr lang="en-US" dirty="0"/>
-              <a:t> group that implements a variety of common functions.</a:t>
-            </a:r>
-          </a:p>
-          <a:p>
-            <a:r>
-              <a:rPr lang="en-US" dirty="0"/>
-              <a:t>The intent of </a:t>
-            </a:r>
-            <a:r>
-              <a:rPr lang="en-US" dirty="0" err="1"/>
-              <a:t>common_code</a:t>
-            </a:r>
-            <a:r>
-              <a:rPr lang="en-US" dirty="0"/>
-              <a:t> is to be a centralized living hub of these important functions.</a:t>
-            </a:r>
-          </a:p>
-          <a:p>
-            <a:r>
-              <a:rPr lang="en-US" dirty="0"/>
-              <a:t>As of November 2024, Jordan Sickle (</a:t>
-            </a:r>
-            <a:r>
-              <a:rPr lang="en-US" dirty="0">
-                <a:hlinkClick r:id="rId2"/>
-              </a:rPr>
-              <a:t>sicklej0720@gmail.com</a:t>
-            </a:r>
-            <a:r>
-              <a:rPr lang="en-US" dirty="0"/>
-              <a:t>) is the author and central maintainer of the code. By May 2025, this task will be covered by Ethan Mullen.</a:t>
-            </a:r>
-          </a:p>
-        </p:txBody>
-      </p:sp>
-    </p:spTree>
-    <p:extLst>
-      <p:ext uri="{BB962C8B-B14F-4D97-AF65-F5344CB8AC3E}">
-        <p14:creationId xmlns:p14="http://schemas.microsoft.com/office/powerpoint/2010/main" val="1794263770"/>
-      </p:ext>
-    </p:extLst>
-  </p:cSld>
-  <p:clrMapOvr>
-    <a:masterClrMapping/>
-  </p:clrMapOvr>
-</p:sld>
-</file>
-
-<file path=ppt/slides/slide3.xml><?xml version="1.0" encoding="utf-8"?>
-<p:sld xmlns:a="http://schemas.openxmlformats.org/drawingml/2006/main" xmlns:r="http://schemas.openxmlformats.org/officeDocument/2006/relationships" xmlns:p="http://schemas.openxmlformats.org/presentationml/2006/main">
-  <p:cSld>
-    <p:spTree>
-      <p:nvGrpSpPr>
-        <p:cNvPr id="1" name=""/>
-        <p:cNvGrpSpPr/>
-        <p:nvPr/>
-      </p:nvGrpSpPr>
-      <p:grpSpPr>
-        <a:xfrm>
-          <a:off x="0" y="0"/>
-          <a:ext cx="0" cy="0"/>
-          <a:chOff x="0" y="0"/>
-          <a:chExt cx="0" cy="0"/>
-        </a:xfrm>
-      </p:grpSpPr>
-      <p:sp>
-        <p:nvSpPr>
-          <p:cNvPr id="2" name="Title 1">
-            <a:extLst>
-              <a:ext uri="{FF2B5EF4-FFF2-40B4-BE49-F238E27FC236}">
-                <a16:creationId xmlns:a16="http://schemas.microsoft.com/office/drawing/2014/main" id="{462A1C18-9B34-28EC-D319-22ACAC34E306}"/>
-              </a:ext>
-            </a:extLst>
-          </p:cNvPr>
-          <p:cNvSpPr>
-            <a:spLocks noGrp="1"/>
-          </p:cNvSpPr>
-          <p:nvPr>
-            <p:ph type="title"/>
-          </p:nvPr>
-        </p:nvSpPr>
-        <p:spPr/>
-        <p:txBody>
-          <a:bodyPr/>
-          <a:lstStyle/>
-          <a:p>
-            <a:r>
-              <a:rPr lang="en-US" dirty="0"/>
-              <a:t>How to use </a:t>
-            </a:r>
-            <a:r>
-              <a:rPr lang="en-US" dirty="0" err="1"/>
-              <a:t>common_code</a:t>
-            </a:r>
-            <a:r>
-              <a:rPr lang="en-US" dirty="0"/>
-              <a:t>: (1) Using </a:t>
-            </a:r>
-            <a:r>
-              <a:rPr lang="en-US" dirty="0" err="1"/>
-              <a:t>Github</a:t>
-            </a:r>
-            <a:endParaRPr lang="en-US" dirty="0"/>
-          </a:p>
-        </p:txBody>
-      </p:sp>
-      <p:sp>
-        <p:nvSpPr>
-          <p:cNvPr id="3" name="Content Placeholder 2">
-            <a:extLst>
-              <a:ext uri="{FF2B5EF4-FFF2-40B4-BE49-F238E27FC236}">
-                <a16:creationId xmlns:a16="http://schemas.microsoft.com/office/drawing/2014/main" id="{02CD8D77-4DB1-22C3-FB31-BF4503DCBB16}"/>
-              </a:ext>
-            </a:extLst>
-          </p:cNvPr>
-          <p:cNvSpPr>
-            <a:spLocks noGrp="1"/>
-          </p:cNvSpPr>
-          <p:nvPr>
-            <p:ph idx="1"/>
-          </p:nvPr>
-        </p:nvSpPr>
-        <p:spPr/>
-        <p:txBody>
-          <a:bodyPr>
-            <a:normAutofit lnSpcReduction="10000"/>
-          </a:bodyPr>
-          <a:lstStyle/>
-          <a:p>
-            <a:r>
-              <a:rPr lang="en-US" dirty="0"/>
-              <a:t>First, ensure that you have </a:t>
-            </a:r>
-            <a:r>
-              <a:rPr lang="en-US" dirty="0" err="1"/>
-              <a:t>Github</a:t>
-            </a:r>
-            <a:r>
-              <a:rPr lang="en-US" dirty="0"/>
-              <a:t> installed and you are logged in.</a:t>
-            </a:r>
-          </a:p>
-          <a:p>
-            <a:r>
-              <a:rPr lang="en-US" dirty="0"/>
-              <a:t>Create a </a:t>
-            </a:r>
-            <a:r>
-              <a:rPr lang="en-US" dirty="0" err="1"/>
-              <a:t>Github</a:t>
-            </a:r>
-            <a:r>
-              <a:rPr lang="en-US" dirty="0"/>
-              <a:t> account, then use </a:t>
-            </a:r>
-            <a:r>
-              <a:rPr lang="en-US" dirty="0">
-                <a:hlinkClick r:id="rId2"/>
-              </a:rPr>
-              <a:t>Set up Git - GitHub Docs</a:t>
-            </a:r>
-            <a:r>
-              <a:rPr lang="en-US" dirty="0"/>
-              <a:t> to create the local-remote SSH key pair for your account-computer pair.</a:t>
-            </a:r>
-          </a:p>
-          <a:p>
-            <a:pPr lvl="1"/>
-            <a:r>
-              <a:rPr lang="en-US" dirty="0"/>
-              <a:t>See </a:t>
-            </a:r>
-            <a:r>
-              <a:rPr lang="en-US" dirty="0">
-                <a:hlinkClick r:id="rId3"/>
-              </a:rPr>
-              <a:t>Set Up with Git and GitHub | </a:t>
-            </a:r>
-            <a:r>
-              <a:rPr lang="en-US" dirty="0" err="1">
-                <a:hlinkClick r:id="rId3"/>
-              </a:rPr>
-              <a:t>Codecademy</a:t>
-            </a:r>
-            <a:r>
-              <a:rPr lang="en-US" dirty="0"/>
-              <a:t> for more advice</a:t>
-            </a:r>
-          </a:p>
-          <a:p>
-            <a:r>
-              <a:rPr lang="en-US" dirty="0"/>
-              <a:t>Log into your </a:t>
-            </a:r>
-            <a:r>
-              <a:rPr lang="en-US" dirty="0" err="1"/>
-              <a:t>github</a:t>
-            </a:r>
-            <a:r>
-              <a:rPr lang="en-US" dirty="0"/>
-              <a:t> account from the command line</a:t>
-            </a:r>
-          </a:p>
-          <a:p>
-            <a:pPr lvl="1"/>
-            <a:r>
-              <a:rPr lang="en-US" dirty="0"/>
-              <a:t>By doing this, you’ll be able to “pull” (get code from) from a given </a:t>
-            </a:r>
-            <a:r>
-              <a:rPr lang="en-US" dirty="0" err="1"/>
-              <a:t>github</a:t>
-            </a:r>
-            <a:r>
-              <a:rPr lang="en-US" dirty="0"/>
-              <a:t> </a:t>
-            </a:r>
-            <a:r>
-              <a:rPr lang="en-US" dirty="0" err="1"/>
-              <a:t>url</a:t>
-            </a:r>
-            <a:r>
-              <a:rPr lang="en-US" dirty="0"/>
-              <a:t> into a local folder of your choosing.</a:t>
-            </a:r>
-          </a:p>
-          <a:p>
-            <a:r>
-              <a:rPr lang="en-US" dirty="0"/>
-              <a:t>The concept of git is that you have a local key (for each computer) and a remote key (on your </a:t>
-            </a:r>
-            <a:r>
-              <a:rPr lang="en-US" dirty="0" err="1"/>
-              <a:t>Github</a:t>
-            </a:r>
-            <a:r>
-              <a:rPr lang="en-US" dirty="0"/>
-              <a:t> account) which are linked together so </a:t>
-            </a:r>
-            <a:r>
-              <a:rPr lang="en-US" dirty="0" err="1"/>
-              <a:t>github</a:t>
-            </a:r>
-            <a:r>
-              <a:rPr lang="en-US" dirty="0"/>
-              <a:t> knows who you are.</a:t>
-            </a:r>
-          </a:p>
-        </p:txBody>
-      </p:sp>
-    </p:spTree>
-    <p:extLst>
-      <p:ext uri="{BB962C8B-B14F-4D97-AF65-F5344CB8AC3E}">
-        <p14:creationId xmlns:p14="http://schemas.microsoft.com/office/powerpoint/2010/main" val="382696903"/>
-      </p:ext>
-    </p:extLst>
-  </p:cSld>
-  <p:clrMapOvr>
-    <a:masterClrMapping/>
-  </p:clrMapOvr>
-</p:sld>
-</file>
-
-<file path=ppt/slides/slide4.xml><?xml version="1.0" encoding="utf-8"?>
-<p:sld xmlns:a="http://schemas.openxmlformats.org/drawingml/2006/main" xmlns:r="http://schemas.openxmlformats.org/officeDocument/2006/relationships" xmlns:p="http://schemas.openxmlformats.org/presentationml/2006/main">
-  <p:cSld>
-    <p:spTree>
-      <p:nvGrpSpPr>
-        <p:cNvPr id="1" name=""/>
-        <p:cNvGrpSpPr/>
-        <p:nvPr/>
-      </p:nvGrpSpPr>
-      <p:grpSpPr>
-        <a:xfrm>
-          <a:off x="0" y="0"/>
-          <a:ext cx="0" cy="0"/>
-          <a:chOff x="0" y="0"/>
-          <a:chExt cx="0" cy="0"/>
-        </a:xfrm>
-      </p:grpSpPr>
-      <p:sp>
-        <p:nvSpPr>
-          <p:cNvPr id="2" name="Title 1">
-            <a:extLst>
-              <a:ext uri="{FF2B5EF4-FFF2-40B4-BE49-F238E27FC236}">
-                <a16:creationId xmlns:a16="http://schemas.microsoft.com/office/drawing/2014/main" id="{2C420FD3-2B95-5657-C381-B2626B44C8F2}"/>
-              </a:ext>
-            </a:extLst>
-          </p:cNvPr>
-          <p:cNvSpPr>
-            <a:spLocks noGrp="1"/>
-          </p:cNvSpPr>
-          <p:nvPr>
-            <p:ph type="title"/>
-          </p:nvPr>
-        </p:nvSpPr>
-        <p:spPr/>
-        <p:txBody>
-          <a:bodyPr/>
-          <a:lstStyle/>
-          <a:p>
-            <a:r>
-              <a:rPr lang="en-US" dirty="0"/>
-              <a:t>How to use common code: (2) Using a git pull to obtain a local copy of </a:t>
+              <a:t>How to use common code: (3) Using a git pull to obtain a local copy of </a:t>
             </a:r>
             <a:r>
               <a:rPr lang="en-US" dirty="0" err="1"/>
@@ -3829,61 +4537,23 @@
         </p:spPr>
         <p:txBody>
           <a:bodyPr>
-            <a:normAutofit fontScale="70000" lnSpcReduction="20000"/>
+            <a:normAutofit fontScale="55000" lnSpcReduction="20000"/>
           </a:bodyPr>
           <a:lstStyle/>
           <a:p>
             <a:r>
               <a:rPr lang="en-US" dirty="0" err="1"/>
-              <a:t>Common_code</a:t>
-            </a:r>
-            <a:r>
-              <a:rPr lang="en-US" dirty="0"/>
-              <a:t> should be cloned from the </a:t>
-            </a:r>
-            <a:r>
-              <a:rPr lang="en-US" dirty="0" err="1"/>
-              <a:t>github</a:t>
-            </a:r>
-            <a:r>
-              <a:rPr lang="en-US" dirty="0"/>
-              <a:t> repository which is located at </a:t>
-            </a:r>
-            <a:r>
-              <a:rPr lang="en-US" dirty="0" err="1">
-                <a:hlinkClick r:id="rId2"/>
-              </a:rPr>
-              <a:t>jmaniscool</a:t>
+              <a:t>common_code</a:t>
+            </a:r>
+            <a:r>
+              <a:rPr lang="en-US" dirty="0"/>
+              <a:t> should be cloned from the GitHub repository which is located at </a:t>
             </a:r>
             <a:r>
               <a:rPr lang="en-US" dirty="0">
                 <a:hlinkClick r:id="rId2"/>
               </a:rPr>
-              <a:t>/</a:t>
-            </a:r>
-            <a:r>
-              <a:rPr lang="en-US" dirty="0" err="1">
-                <a:hlinkClick r:id="rId2"/>
-              </a:rPr>
-              <a:t>common_code</a:t>
-            </a:r>
-            <a:r>
-              <a:rPr lang="en-US" dirty="0">
-                <a:hlinkClick r:id="rId2"/>
-              </a:rPr>
-              <a:t>: Common code for the </a:t>
-            </a:r>
-            <a:r>
-              <a:rPr lang="en-US" dirty="0" err="1">
-                <a:hlinkClick r:id="rId2"/>
-              </a:rPr>
-              <a:t>Dahmen</a:t>
-            </a:r>
-            <a:r>
-              <a:rPr lang="en-US" dirty="0">
-                <a:hlinkClick r:id="rId2"/>
-              </a:rPr>
-              <a:t> group.</a:t>
+              <a:t>jmaniscool/common_code: Common code for the Dahmen group.</a:t>
             </a:r>
             <a:endParaRPr lang="en-US" dirty="0"/>
           </a:p>
@@ -3902,15 +4572,14 @@
           </a:p>
           <a:p>
             <a:r>
-              <a:rPr lang="en-US" b="1" dirty="0"/>
-              <a:t>Note that you can clone into multiple local repositories!</a:t>
-            </a:r>
-          </a:p>
-          <a:p>
-            <a:pPr lvl="1"/>
-            <a:r>
-              <a:rPr lang="en-US" dirty="0"/>
-              <a:t>Jordan recommends that you have a different folder for each project, then clone </a:t>
+              <a:rPr lang="en-US" dirty="0"/>
+              <a:t>While it is possible to clone a remote repo into multiple local folders, this can be cumbersome since each local copy needs to be individually synced via a “git pull” command.</a:t>
+            </a:r>
+          </a:p>
+          <a:p>
+            <a:r>
+              <a:rPr lang="en-US" dirty="0"/>
+              <a:t>The better way to do this is to clone </a:t>
             </a:r>
             <a:r>
               <a:rPr lang="en-US" dirty="0" err="1"/>
@@ -3918,14 +4587,14 @@
             </a:r>
             <a:r>
               <a:rPr lang="en-US" dirty="0"/>
-              <a:t> into each folder. </a:t>
+              <a:t> to a single master directory, then ensure that directory is on your Python’s system path every time you run it</a:t>
             </a:r>
           </a:p>
           <a:p>
             <a:pPr lvl="1"/>
             <a:r>
               <a:rPr lang="en-US" dirty="0"/>
-              <a:t>You will have to make sure your </a:t>
+              <a:t>This lets python “see” </a:t>
             </a:r>
             <a:r>
               <a:rPr lang="en-US" dirty="0" err="1"/>
@@ -3933,7 +4602,40 @@
             </a:r>
             <a:r>
               <a:rPr lang="en-US" dirty="0"/>
-              <a:t> is up to date in each copy by running “git pull” occasionally!</a:t>
+              <a:t> so it can be imported from multiple locations. (i.e. how NumPy works)</a:t>
+            </a:r>
+          </a:p>
+          <a:p>
+            <a:pPr lvl="1"/>
+            <a:r>
+              <a:rPr lang="en-US" dirty="0"/>
+              <a:t>To do this, at the beginning of every analysis script you must have:</a:t>
+            </a:r>
+          </a:p>
+          <a:p>
+            <a:pPr lvl="2"/>
+            <a:r>
+              <a:rPr lang="en-US" dirty="0"/>
+              <a:t>import sys</a:t>
+            </a:r>
+          </a:p>
+          <a:p>
+            <a:pPr lvl="2"/>
+            <a:r>
+              <a:rPr lang="en-US" dirty="0" err="1"/>
+              <a:t>sys.path.append</a:t>
+            </a:r>
+            <a:r>
+              <a:rPr lang="en-US" dirty="0"/>
+              <a:t>(</a:t>
+            </a:r>
+            <a:r>
+              <a:rPr lang="en-US" dirty="0" err="1"/>
+              <a:t>path_to_common_code</a:t>
+            </a:r>
+            <a:r>
+              <a:rPr lang="en-US" dirty="0"/>
+              <a:t>)</a:t>
             </a:r>
           </a:p>
         </p:txBody>
@@ -4305,7 +5007,7 @@
 </p:sld>
 </file>
 
-<file path=ppt/slides/slide5.xml><?xml version="1.0" encoding="utf-8"?>
+<file path=ppt/slides/slide14.xml><?xml version="1.0" encoding="utf-8"?>
 <p:sld xmlns:a="http://schemas.openxmlformats.org/drawingml/2006/main" xmlns:r="http://schemas.openxmlformats.org/officeDocument/2006/relationships" xmlns:p="http://schemas.openxmlformats.org/presentationml/2006/main">
   <p:cSld>
     <p:spTree>
@@ -4345,7 +5047,7 @@
           <a:p>
             <a:r>
               <a:rPr lang="en-US" dirty="0"/>
-              <a:t>How to use common code: (3) accessing the functions</a:t>
+              <a:t>How to use common code: (4) accessing the functions</a:t>
             </a:r>
           </a:p>
         </p:txBody>
@@ -4374,13 +5076,13 @@
         </p:spPr>
         <p:txBody>
           <a:bodyPr>
-            <a:normAutofit fontScale="85000" lnSpcReduction="20000"/>
+            <a:normAutofit fontScale="47500" lnSpcReduction="20000"/>
           </a:bodyPr>
           <a:lstStyle/>
           <a:p>
             <a:r>
               <a:rPr lang="en-US" dirty="0" err="1"/>
-              <a:t>Common_code</a:t>
+              <a:t>common_code</a:t>
             </a:r>
             <a:r>
               <a:rPr lang="en-US" dirty="0"/>
@@ -4404,6 +5106,46 @@
             <a:r>
               <a:rPr lang="en-US" dirty="0"/>
               <a:t>.</a:t>
+            </a:r>
+          </a:p>
+          <a:p>
+            <a:r>
+              <a:rPr lang="en-US" dirty="0"/>
+              <a:t>You can also access the functions from any analysis script if you have the following code at the beginning of the script </a:t>
+            </a:r>
+            <a:r>
+              <a:rPr lang="en-US" b="1" dirty="0"/>
+              <a:t>(this is the suggested way!)</a:t>
+            </a:r>
+            <a:r>
+              <a:rPr lang="en-US" dirty="0"/>
+              <a:t>:</a:t>
+            </a:r>
+          </a:p>
+          <a:p>
+            <a:pPr lvl="1"/>
+            <a:r>
+              <a:rPr lang="en-US" dirty="0"/>
+              <a:t>import sys</a:t>
+            </a:r>
+          </a:p>
+          <a:p>
+            <a:pPr lvl="1"/>
+            <a:r>
+              <a:rPr lang="en-US" dirty="0" err="1"/>
+              <a:t>sys.path.append</a:t>
+            </a:r>
+            <a:r>
+              <a:rPr lang="en-US" dirty="0"/>
+              <a:t>(</a:t>
+            </a:r>
+            <a:r>
+              <a:rPr lang="en-US" dirty="0" err="1"/>
+              <a:t>path_to_common_code</a:t>
+            </a:r>
+            <a:r>
+              <a:rPr lang="en-US" dirty="0"/>
+              <a:t>)</a:t>
             </a:r>
           </a:p>
         </p:txBody>
@@ -4457,7 +5199,7 @@
 </p:sld>
 </file>
 
-<file path=ppt/slides/slide6.xml><?xml version="1.0" encoding="utf-8"?>
+<file path=ppt/slides/slide15.xml><?xml version="1.0" encoding="utf-8"?>
 <p:sld xmlns:a="http://schemas.openxmlformats.org/drawingml/2006/main" xmlns:r="http://schemas.openxmlformats.org/officeDocument/2006/relationships" xmlns:p="http://schemas.openxmlformats.org/presentationml/2006/main">
   <p:cSld>
     <p:spTree>
@@ -5308,7 +6050,7 @@
 </p:sld>
 </file>
 
-<file path=ppt/slides/slide7.xml><?xml version="1.0" encoding="utf-8"?>
+<file path=ppt/slides/slide16.xml><?xml version="1.0" encoding="utf-8"?>
 <p:sld xmlns:a="http://schemas.openxmlformats.org/drawingml/2006/main" xmlns:r="http://schemas.openxmlformats.org/officeDocument/2006/relationships" xmlns:p="http://schemas.openxmlformats.org/presentationml/2006/main">
   <p:cSld>
     <p:spTree>
@@ -5330,7 +6072,7 @@
           <p:cNvPr id="2" name="Title 1">
             <a:extLst>
               <a:ext uri="{FF2B5EF4-FFF2-40B4-BE49-F238E27FC236}">
-                <a16:creationId xmlns:a16="http://schemas.microsoft.com/office/drawing/2014/main" id="{E76F4F84-8F82-FA8C-A42A-F4D7A48C6466}"/>
+                <a16:creationId xmlns:a16="http://schemas.microsoft.com/office/drawing/2014/main" id="{EFEB170C-5406-3308-2078-CCCCB891D6E8}"/>
               </a:ext>
             </a:extLst>
           </p:cNvPr>
@@ -5347,12 +6089,8 @@
           <a:lstStyle/>
           <a:p>
             <a:r>
-              <a:rPr lang="en-US" dirty="0" err="1"/>
-              <a:t>Github</a:t>
-            </a:r>
-            <a:r>
-              <a:rPr lang="en-US" dirty="0"/>
-              <a:t> basics</a:t>
+              <a:rPr lang="en-US" dirty="0"/>
+              <a:t>Reporting issues</a:t>
             </a:r>
           </a:p>
         </p:txBody>
@@ -5362,7 +6100,7 @@
           <p:cNvPr id="3" name="Content Placeholder 2">
             <a:extLst>
               <a:ext uri="{FF2B5EF4-FFF2-40B4-BE49-F238E27FC236}">
-                <a16:creationId xmlns:a16="http://schemas.microsoft.com/office/drawing/2014/main" id="{33CDC2A9-9CBD-82D4-EEAC-D69B14A7A2CC}"/>
+                <a16:creationId xmlns:a16="http://schemas.microsoft.com/office/drawing/2014/main" id="{F26E4D2E-762D-D491-1517-CE00F1D0042A}"/>
               </a:ext>
             </a:extLst>
           </p:cNvPr>
@@ -5373,27 +6111,14 @@
             <p:ph idx="1"/>
           </p:nvPr>
         </p:nvSpPr>
-        <p:spPr>
-          <a:xfrm>
-            <a:off x="838200" y="1825625"/>
-            <a:ext cx="10777330" cy="4469158"/>
-          </a:xfrm>
-        </p:spPr>
-        <p:txBody>
-          <a:bodyPr>
-            <a:normAutofit fontScale="62500" lnSpcReduction="20000"/>
-          </a:bodyPr>
-          <a:lstStyle/>
-          <a:p>
-            <a:r>
-              <a:rPr lang="en-US" dirty="0"/>
-              <a:t>Git is a local program that can track changes made in files on your system. This can be useful if you want to ensure you are able to track down issues with specific lines and stop having files named stuff like “analysis_working_v2_final_old.py”.</a:t>
-            </a:r>
-          </a:p>
-          <a:p>
-            <a:r>
-              <a:rPr lang="en-US" dirty="0"/>
-              <a:t>To make a repository, you need to tell git which files to track changes in, add them to be possibly included in the repository (staged), and commit (save) the changes. These changes are tracked by a .git file which is contained in the root of the </a:t>
+        <p:spPr/>
+        <p:txBody>
+          <a:bodyPr/>
+          <a:lstStyle/>
+          <a:p>
+            <a:r>
+              <a:rPr lang="en-US" dirty="0"/>
+              <a:t>If you find any issues, you can report them by going to the </a:t>
             </a:r>
             <a:r>
               <a:rPr lang="en-US" dirty="0" err="1"/>
@@ -5401,116 +6126,49 @@
             </a:r>
             <a:r>
               <a:rPr lang="en-US" dirty="0"/>
-              <a:t> directory.</a:t>
+              <a:t> repo, then selecting the “issues” tab. This is located at </a:t>
+            </a:r>
+            <a:r>
+              <a:rPr lang="en-US" dirty="0">
+                <a:hlinkClick r:id="rId2"/>
+              </a:rPr>
+              <a:t>Issues · </a:t>
+            </a:r>
+            <a:r>
+              <a:rPr lang="en-US" dirty="0" err="1">
+                <a:hlinkClick r:id="rId2"/>
+              </a:rPr>
+              <a:t>jmaniscool</a:t>
+            </a:r>
+            <a:r>
+              <a:rPr lang="en-US" dirty="0">
+                <a:hlinkClick r:id="rId2"/>
+              </a:rPr>
+              <a:t>/</a:t>
+            </a:r>
+            <a:r>
+              <a:rPr lang="en-US" dirty="0" err="1">
+                <a:hlinkClick r:id="rId2"/>
+              </a:rPr>
+              <a:t>common_code</a:t>
+            </a:r>
+            <a:r>
+              <a:rPr lang="en-US" dirty="0"/>
+              <a:t>.</a:t>
             </a:r>
           </a:p>
           <a:p>
             <a:pPr lvl="1"/>
             <a:r>
               <a:rPr lang="en-US" dirty="0"/>
-              <a:t>You can access remote </a:t>
-            </a:r>
-            <a:r>
-              <a:rPr lang="en-US" dirty="0" err="1"/>
-              <a:t>github</a:t>
-            </a:r>
-            <a:r>
-              <a:rPr lang="en-US" dirty="0"/>
-              <a:t> repositories if you are logged in via an email address and a local-remote SSH key pair. This connects your local git to the remote repository.</a:t>
-            </a:r>
-          </a:p>
-          <a:p>
-            <a:r>
-              <a:rPr lang="en-US" dirty="0"/>
-              <a:t>Some important functions:</a:t>
+              <a:t>When opening an issue, please include a minimal working example to show how the code is broken and what the expected behavior is.</a:t>
             </a:r>
           </a:p>
           <a:p>
             <a:pPr lvl="1"/>
             <a:r>
               <a:rPr lang="en-US" dirty="0"/>
-              <a:t>Git add x: Add file x (or the changes made to x) to be “staged” (i.e. ready to commit to the local </a:t>
-            </a:r>
-            <a:r>
-              <a:rPr lang="en-US" dirty="0" err="1"/>
-              <a:t>github</a:t>
-            </a:r>
-            <a:r>
-              <a:rPr lang="en-US" dirty="0"/>
-              <a:t> repository)</a:t>
-            </a:r>
-          </a:p>
-          <a:p>
-            <a:pPr lvl="1"/>
-            <a:r>
-              <a:rPr lang="en-US" dirty="0"/>
-              <a:t>Git commit –m “Short description of change”: Commits the changes made to all added files with message “Short description of change”. All commits require a message, so please make sure it is short (~75 characters) and direct about what changes are made.</a:t>
-            </a:r>
-          </a:p>
-          <a:p>
-            <a:pPr lvl="1"/>
-            <a:r>
-              <a:rPr lang="en-US" dirty="0"/>
-              <a:t>Git status: Check which files have been changed compared to the last time you committed.</a:t>
-            </a:r>
-          </a:p>
-          <a:p>
-            <a:pPr lvl="1"/>
-            <a:r>
-              <a:rPr lang="en-US" dirty="0"/>
-              <a:t>Git diff x: Check the differences between your updated copy of x and the most recently committed version of x.</a:t>
-            </a:r>
-          </a:p>
-          <a:p>
-            <a:pPr lvl="1"/>
-            <a:r>
-              <a:rPr lang="en-US" dirty="0"/>
-              <a:t>Git restore x: Restore x to the state it was in the last time it was committed.</a:t>
-            </a:r>
-          </a:p>
-          <a:p>
-            <a:pPr lvl="1"/>
-            <a:r>
-              <a:rPr lang="en-US" dirty="0"/>
-              <a:t>Git remote add origin url: add branch “origin” to the remote repository (i.e. </a:t>
-            </a:r>
-            <a:r>
-              <a:rPr lang="en-US" dirty="0" err="1"/>
-              <a:t>github</a:t>
-            </a:r>
-            <a:r>
-              <a:rPr lang="en-US" dirty="0"/>
-              <a:t>) at the given </a:t>
-            </a:r>
-            <a:r>
-              <a:rPr lang="en-US" dirty="0" err="1"/>
-              <a:t>url</a:t>
-            </a:r>
-            <a:r>
-              <a:rPr lang="en-US" dirty="0"/>
-              <a:t>.</a:t>
-            </a:r>
-          </a:p>
-          <a:p>
-            <a:pPr lvl="1"/>
-            <a:r>
-              <a:rPr lang="en-US" dirty="0"/>
-              <a:t>Git pull: Pull the most recent version of the repository from the remote repository location.</a:t>
-            </a:r>
-          </a:p>
-          <a:p>
-            <a:pPr lvl="1"/>
-            <a:r>
-              <a:rPr lang="en-US" b="1" dirty="0"/>
-              <a:t>Note that these commands must be called from within </a:t>
-            </a:r>
-            <a:r>
-              <a:rPr lang="en-US" b="1" dirty="0" err="1"/>
-              <a:t>common_code</a:t>
-            </a:r>
-            <a:r>
-              <a:rPr lang="en-US" b="1" dirty="0"/>
-              <a:t>!</a:t>
+              <a:t>The more specific you are, the better the fix will be (i.e. better documentation).</a:t>
             </a:r>
           </a:p>
         </p:txBody>
@@ -5518,7 +6176,7 @@
     </p:spTree>
     <p:extLst>
       <p:ext uri="{BB962C8B-B14F-4D97-AF65-F5344CB8AC3E}">
-        <p14:creationId xmlns:p14="http://schemas.microsoft.com/office/powerpoint/2010/main" val="124115520"/>
+        <p14:creationId xmlns:p14="http://schemas.microsoft.com/office/powerpoint/2010/main" val="4163278239"/>
       </p:ext>
     </p:extLst>
   </p:cSld>
@@ -5528,7 +6186,7 @@
 </p:sld>
 </file>
 
-<file path=ppt/slides/slide8.xml><?xml version="1.0" encoding="utf-8"?>
+<file path=ppt/slides/slide2.xml><?xml version="1.0" encoding="utf-8"?>
 <p:sld xmlns:a="http://schemas.openxmlformats.org/drawingml/2006/main" xmlns:r="http://schemas.openxmlformats.org/officeDocument/2006/relationships" xmlns:p="http://schemas.openxmlformats.org/presentationml/2006/main">
   <p:cSld>
     <p:spTree>
@@ -5550,7 +6208,7 @@
           <p:cNvPr id="2" name="Title 1">
             <a:extLst>
               <a:ext uri="{FF2B5EF4-FFF2-40B4-BE49-F238E27FC236}">
-                <a16:creationId xmlns:a16="http://schemas.microsoft.com/office/drawing/2014/main" id="{EFEB170C-5406-3308-2078-CCCCB891D6E8}"/>
+                <a16:creationId xmlns:a16="http://schemas.microsoft.com/office/drawing/2014/main" id="{5152730C-A289-F15E-38CF-D4A137745615}"/>
               </a:ext>
             </a:extLst>
           </p:cNvPr>
@@ -5568,7 +6226,7 @@
           <a:p>
             <a:r>
               <a:rPr lang="en-US" dirty="0"/>
-              <a:t>Reporting issues</a:t>
+              <a:t>Summary</a:t>
             </a:r>
           </a:p>
         </p:txBody>
@@ -5578,7 +6236,7 @@
           <p:cNvPr id="3" name="Content Placeholder 2">
             <a:extLst>
               <a:ext uri="{FF2B5EF4-FFF2-40B4-BE49-F238E27FC236}">
-                <a16:creationId xmlns:a16="http://schemas.microsoft.com/office/drawing/2014/main" id="{F26E4D2E-762D-D491-1517-CE00F1D0042A}"/>
+                <a16:creationId xmlns:a16="http://schemas.microsoft.com/office/drawing/2014/main" id="{81545EF6-CA95-CD5E-DE8A-7F73B569B150}"/>
               </a:ext>
             </a:extLst>
           </p:cNvPr>
@@ -5595,8 +6253,26 @@
           <a:lstStyle/>
           <a:p>
             <a:r>
-              <a:rPr lang="en-US" dirty="0"/>
-              <a:t>If you find any issues, you can report them by going to the </a:t>
+              <a:rPr lang="en-US" dirty="0" err="1"/>
+              <a:t>Common_code</a:t>
+            </a:r>
+            <a:r>
+              <a:rPr lang="en-US" dirty="0"/>
+              <a:t> is a repository of commonly used functions for the </a:t>
+            </a:r>
+            <a:r>
+              <a:rPr lang="en-US" dirty="0" err="1"/>
+              <a:t>Dahmen</a:t>
+            </a:r>
+            <a:r>
+              <a:rPr lang="en-US" dirty="0"/>
+              <a:t> group that implements a variety of common functions.</a:t>
+            </a:r>
+          </a:p>
+          <a:p>
+            <a:r>
+              <a:rPr lang="en-US" dirty="0"/>
+              <a:t>The intent of </a:t>
             </a:r>
             <a:r>
               <a:rPr lang="en-US" dirty="0" err="1"/>
@@ -5604,49 +6280,388 @@
             </a:r>
             <a:r>
               <a:rPr lang="en-US" dirty="0"/>
-              <a:t> repo, then selecting the “issues” tab. This is located at </a:t>
+              <a:t> is to be a centralized living hub of these important functions.</a:t>
+            </a:r>
+          </a:p>
+          <a:p>
+            <a:r>
+              <a:rPr lang="en-US" dirty="0"/>
+              <a:t>As of November 2024, Jordan Sickle (</a:t>
             </a:r>
             <a:r>
               <a:rPr lang="en-US" dirty="0">
                 <a:hlinkClick r:id="rId2"/>
               </a:rPr>
-              <a:t>Issues · </a:t>
-            </a:r>
-            <a:r>
-              <a:rPr lang="en-US" dirty="0" err="1">
-                <a:hlinkClick r:id="rId2"/>
-              </a:rPr>
-              <a:t>jmaniscool</a:t>
+              <a:t>sicklej0720@gmail.com</a:t>
+            </a:r>
+            <a:r>
+              <a:rPr lang="en-US" dirty="0"/>
+              <a:t>) is the author and central maintainer of the code. By May 2025, this task will be covered by Ethan Mullen.</a:t>
+            </a:r>
+          </a:p>
+        </p:txBody>
+      </p:sp>
+    </p:spTree>
+    <p:extLst>
+      <p:ext uri="{BB962C8B-B14F-4D97-AF65-F5344CB8AC3E}">
+        <p14:creationId xmlns:p14="http://schemas.microsoft.com/office/powerpoint/2010/main" val="1794263770"/>
+      </p:ext>
+    </p:extLst>
+  </p:cSld>
+  <p:clrMapOvr>
+    <a:masterClrMapping/>
+  </p:clrMapOvr>
+</p:sld>
+</file>
+
+<file path=ppt/slides/slide3.xml><?xml version="1.0" encoding="utf-8"?>
+<p:sld xmlns:a="http://schemas.openxmlformats.org/drawingml/2006/main" xmlns:r="http://schemas.openxmlformats.org/officeDocument/2006/relationships" xmlns:p="http://schemas.openxmlformats.org/presentationml/2006/main">
+  <p:cSld>
+    <p:spTree>
+      <p:nvGrpSpPr>
+        <p:cNvPr id="1" name=""/>
+        <p:cNvGrpSpPr/>
+        <p:nvPr/>
+      </p:nvGrpSpPr>
+      <p:grpSpPr>
+        <a:xfrm>
+          <a:off x="0" y="0"/>
+          <a:ext cx="0" cy="0"/>
+          <a:chOff x="0" y="0"/>
+          <a:chExt cx="0" cy="0"/>
+        </a:xfrm>
+      </p:grpSpPr>
+      <p:sp>
+        <p:nvSpPr>
+          <p:cNvPr id="2" name="Title 1">
+            <a:extLst>
+              <a:ext uri="{FF2B5EF4-FFF2-40B4-BE49-F238E27FC236}">
+                <a16:creationId xmlns:a16="http://schemas.microsoft.com/office/drawing/2014/main" id="{E76F4F84-8F82-FA8C-A42A-F4D7A48C6466}"/>
+              </a:ext>
+            </a:extLst>
+          </p:cNvPr>
+          <p:cNvSpPr>
+            <a:spLocks noGrp="1"/>
+          </p:cNvSpPr>
+          <p:nvPr>
+            <p:ph type="title"/>
+          </p:nvPr>
+        </p:nvSpPr>
+        <p:spPr/>
+        <p:txBody>
+          <a:bodyPr/>
+          <a:lstStyle/>
+          <a:p>
+            <a:r>
+              <a:rPr lang="en-US" dirty="0"/>
+              <a:t>Git and </a:t>
+            </a:r>
+            <a:r>
+              <a:rPr lang="en-US" dirty="0" err="1"/>
+              <a:t>github</a:t>
+            </a:r>
+            <a:r>
+              <a:rPr lang="en-US" dirty="0"/>
+              <a:t> basics</a:t>
+            </a:r>
+          </a:p>
+        </p:txBody>
+      </p:sp>
+      <p:sp>
+        <p:nvSpPr>
+          <p:cNvPr id="3" name="Content Placeholder 2">
+            <a:extLst>
+              <a:ext uri="{FF2B5EF4-FFF2-40B4-BE49-F238E27FC236}">
+                <a16:creationId xmlns:a16="http://schemas.microsoft.com/office/drawing/2014/main" id="{33CDC2A9-9CBD-82D4-EEAC-D69B14A7A2CC}"/>
+              </a:ext>
+            </a:extLst>
+          </p:cNvPr>
+          <p:cNvSpPr>
+            <a:spLocks noGrp="1"/>
+          </p:cNvSpPr>
+          <p:nvPr>
+            <p:ph idx="1"/>
+          </p:nvPr>
+        </p:nvSpPr>
+        <p:spPr>
+          <a:xfrm>
+            <a:off x="838200" y="1825625"/>
+            <a:ext cx="10777330" cy="4469158"/>
+          </a:xfrm>
+        </p:spPr>
+        <p:txBody>
+          <a:bodyPr>
+            <a:normAutofit fontScale="62500" lnSpcReduction="20000"/>
+          </a:bodyPr>
+          <a:lstStyle/>
+          <a:p>
+            <a:r>
+              <a:rPr lang="en-US" dirty="0"/>
+              <a:t>Git is a local program that can track changes made in files on your system. This can be useful if you want to ensure you are able to track down issues with specific lines and stop having files named stuff like “analysis_working_v2_final_old.py”.</a:t>
+            </a:r>
+          </a:p>
+          <a:p>
+            <a:r>
+              <a:rPr lang="en-US" dirty="0"/>
+              <a:t>To make a repository, you need to tell Git which files to track changes in, add them to be possibly included in the repository (staged), and commit (save) the changes. These changes are tracked by a .git file which is contained in the root of the i.e. </a:t>
+            </a:r>
+            <a:r>
+              <a:rPr lang="en-US" dirty="0" err="1"/>
+              <a:t>common_code</a:t>
+            </a:r>
+            <a:r>
+              <a:rPr lang="en-US" dirty="0"/>
+              <a:t> directory.</a:t>
+            </a:r>
+          </a:p>
+          <a:p>
+            <a:pPr lvl="1"/>
+            <a:r>
+              <a:rPr lang="en-US" dirty="0"/>
+              <a:t>You can access remote GitHub repositories if you are logged in via an email address and a local-remote SSH key pair. This connects your local git to the remote repository.</a:t>
+            </a:r>
+          </a:p>
+          <a:p>
+            <a:r>
+              <a:rPr lang="en-US" dirty="0"/>
+              <a:t>Some important functions:</a:t>
+            </a:r>
+          </a:p>
+          <a:p>
+            <a:pPr lvl="1"/>
+            <a:r>
+              <a:rPr lang="en-US" dirty="0"/>
+              <a:t>git add x: Add file x (or the changes made to x) to be “staged” (i.e. ready to commit to the local GitHub repository)</a:t>
+            </a:r>
+          </a:p>
+          <a:p>
+            <a:pPr lvl="1"/>
+            <a:r>
+              <a:rPr lang="en-US" dirty="0"/>
+              <a:t>git commit –m “Short description of change”: Commits the changes made to all added files with message “Short description of change”. All commits require a message, so please make sure it is short (~75 characters) and direct about what changes are made.</a:t>
+            </a:r>
+          </a:p>
+          <a:p>
+            <a:pPr lvl="1"/>
+            <a:r>
+              <a:rPr lang="en-US" dirty="0"/>
+              <a:t>git status: Check which files have been changed compared to the last time you committed.</a:t>
+            </a:r>
+          </a:p>
+          <a:p>
+            <a:pPr lvl="1"/>
+            <a:r>
+              <a:rPr lang="en-US" dirty="0"/>
+              <a:t>git diff x: Check the differences between your updated copy of x and the most recently committed version of x.</a:t>
+            </a:r>
+          </a:p>
+          <a:p>
+            <a:pPr lvl="1"/>
+            <a:r>
+              <a:rPr lang="en-US" dirty="0"/>
+              <a:t>git restore x: Restore x to the state it was in the last time it was committed.</a:t>
+            </a:r>
+          </a:p>
+          <a:p>
+            <a:pPr lvl="1"/>
+            <a:r>
+              <a:rPr lang="en-US" dirty="0"/>
+              <a:t>git remote add origin url: add branch “origin” to the remote repository (i.e. GitHub) at the given URL.</a:t>
+            </a:r>
+          </a:p>
+          <a:p>
+            <a:pPr lvl="1"/>
+            <a:r>
+              <a:rPr lang="en-US" dirty="0"/>
+              <a:t>git pull: Pull the most recent version of the repository from the remote repository location.</a:t>
+            </a:r>
+          </a:p>
+          <a:p>
+            <a:pPr lvl="1"/>
+            <a:r>
+              <a:rPr lang="en-US" b="1" dirty="0"/>
+              <a:t>Note that these commands must be called from within </a:t>
+            </a:r>
+            <a:r>
+              <a:rPr lang="en-US" b="1" dirty="0" err="1"/>
+              <a:t>common_code</a:t>
+            </a:r>
+            <a:r>
+              <a:rPr lang="en-US" b="1" dirty="0"/>
+              <a:t>!</a:t>
+            </a:r>
+          </a:p>
+        </p:txBody>
+      </p:sp>
+    </p:spTree>
+    <p:extLst>
+      <p:ext uri="{BB962C8B-B14F-4D97-AF65-F5344CB8AC3E}">
+        <p14:creationId xmlns:p14="http://schemas.microsoft.com/office/powerpoint/2010/main" val="124115520"/>
+      </p:ext>
+    </p:extLst>
+  </p:cSld>
+  <p:clrMapOvr>
+    <a:masterClrMapping/>
+  </p:clrMapOvr>
+</p:sld>
+</file>
+
+<file path=ppt/slides/slide4.xml><?xml version="1.0" encoding="utf-8"?>
+<p:sld xmlns:a="http://schemas.openxmlformats.org/drawingml/2006/main" xmlns:r="http://schemas.openxmlformats.org/officeDocument/2006/relationships" xmlns:p="http://schemas.openxmlformats.org/presentationml/2006/main">
+  <p:cSld>
+    <p:spTree>
+      <p:nvGrpSpPr>
+        <p:cNvPr id="1" name=""/>
+        <p:cNvGrpSpPr/>
+        <p:nvPr/>
+      </p:nvGrpSpPr>
+      <p:grpSpPr>
+        <a:xfrm>
+          <a:off x="0" y="0"/>
+          <a:ext cx="0" cy="0"/>
+          <a:chOff x="0" y="0"/>
+          <a:chExt cx="0" cy="0"/>
+        </a:xfrm>
+      </p:grpSpPr>
+      <p:sp>
+        <p:nvSpPr>
+          <p:cNvPr id="2" name="Title 1">
+            <a:extLst>
+              <a:ext uri="{FF2B5EF4-FFF2-40B4-BE49-F238E27FC236}">
+                <a16:creationId xmlns:a16="http://schemas.microsoft.com/office/drawing/2014/main" id="{462A1C18-9B34-28EC-D319-22ACAC34E306}"/>
+              </a:ext>
+            </a:extLst>
+          </p:cNvPr>
+          <p:cNvSpPr>
+            <a:spLocks noGrp="1"/>
+          </p:cNvSpPr>
+          <p:nvPr>
+            <p:ph type="title"/>
+          </p:nvPr>
+        </p:nvSpPr>
+        <p:spPr/>
+        <p:txBody>
+          <a:bodyPr/>
+          <a:lstStyle/>
+          <a:p>
+            <a:r>
+              <a:rPr lang="en-US" dirty="0"/>
+              <a:t>How to use </a:t>
+            </a:r>
+            <a:r>
+              <a:rPr lang="en-US" dirty="0" err="1"/>
+              <a:t>common_code</a:t>
+            </a:r>
+            <a:r>
+              <a:rPr lang="en-US" dirty="0"/>
+              <a:t>: (1) Using </a:t>
+            </a:r>
+            <a:r>
+              <a:rPr lang="en-US" dirty="0" err="1"/>
+              <a:t>Github</a:t>
+            </a:r>
+            <a:endParaRPr lang="en-US" dirty="0"/>
+          </a:p>
+        </p:txBody>
+      </p:sp>
+      <p:sp>
+        <p:nvSpPr>
+          <p:cNvPr id="3" name="Content Placeholder 2">
+            <a:extLst>
+              <a:ext uri="{FF2B5EF4-FFF2-40B4-BE49-F238E27FC236}">
+                <a16:creationId xmlns:a16="http://schemas.microsoft.com/office/drawing/2014/main" id="{02CD8D77-4DB1-22C3-FB31-BF4503DCBB16}"/>
+              </a:ext>
+            </a:extLst>
+          </p:cNvPr>
+          <p:cNvSpPr>
+            <a:spLocks noGrp="1"/>
+          </p:cNvSpPr>
+          <p:nvPr>
+            <p:ph idx="1"/>
+          </p:nvPr>
+        </p:nvSpPr>
+        <p:spPr/>
+        <p:txBody>
+          <a:bodyPr>
+            <a:normAutofit fontScale="85000" lnSpcReduction="20000"/>
+          </a:bodyPr>
+          <a:lstStyle/>
+          <a:p>
+            <a:r>
+              <a:rPr lang="en-US" dirty="0"/>
+              <a:t>First, ensure that you have Git (the program that manages changes to repositories) installed and you are logged in to GitHub.</a:t>
+            </a:r>
+          </a:p>
+          <a:p>
+            <a:pPr lvl="1"/>
+            <a:r>
+              <a:rPr lang="en-US" dirty="0"/>
+              <a:t>Git installed by default on Mac, but must be installed on Windows.</a:t>
+            </a:r>
+          </a:p>
+          <a:p>
+            <a:pPr lvl="1"/>
+            <a:r>
+              <a:rPr lang="en-US" dirty="0"/>
+              <a:t>Git is the program, and GitHub is the online service that hosts the remote repository (code folder)</a:t>
+            </a:r>
+          </a:p>
+          <a:p>
+            <a:r>
+              <a:rPr lang="en-US" dirty="0"/>
+              <a:t>Create a GitHub account, then use </a:t>
             </a:r>
             <a:r>
               <a:rPr lang="en-US" dirty="0">
                 <a:hlinkClick r:id="rId2"/>
               </a:rPr>
-              <a:t>/</a:t>
+              <a:t>Set up Git - GitHub Docs</a:t>
+            </a:r>
+            <a:r>
+              <a:rPr lang="en-US" dirty="0"/>
+              <a:t> to create the local-remote SSH key pair for your account-computer pair.</a:t>
+            </a:r>
+          </a:p>
+          <a:p>
+            <a:pPr lvl="1"/>
+            <a:r>
+              <a:rPr lang="en-US" dirty="0"/>
+              <a:t>See </a:t>
+            </a:r>
+            <a:r>
+              <a:rPr lang="en-US" dirty="0">
+                <a:hlinkClick r:id="rId3"/>
+              </a:rPr>
+              <a:t>Set Up with Git and GitHub | </a:t>
             </a:r>
             <a:r>
               <a:rPr lang="en-US" dirty="0" err="1">
-                <a:hlinkClick r:id="rId2"/>
+                <a:hlinkClick r:id="rId3"/>
               </a:rPr>
-              <a:t>common_code</a:t>
-            </a:r>
-            <a:r>
-              <a:rPr lang="en-US" dirty="0"/>
-              <a:t>.</a:t>
+              <a:t>Codecademy</a:t>
+            </a:r>
+            <a:r>
+              <a:rPr lang="en-US" dirty="0"/>
+              <a:t> for more advice</a:t>
+            </a:r>
+          </a:p>
+          <a:p>
+            <a:r>
+              <a:rPr lang="en-US" dirty="0"/>
+              <a:t>Log into your GitHub account from the command line</a:t>
             </a:r>
           </a:p>
           <a:p>
             <a:pPr lvl="1"/>
             <a:r>
               <a:rPr lang="en-US" dirty="0"/>
-              <a:t>When opening an issue, please include a minimal working example to show how the code is broken and what the expected behavior is.</a:t>
-            </a:r>
-          </a:p>
-          <a:p>
-            <a:pPr lvl="1"/>
-            <a:r>
-              <a:rPr lang="en-US" dirty="0"/>
-              <a:t>The more specific you are, the better the fix will be (i.e. better documentation).</a:t>
+              <a:t>By doing this, you’ll be able to “pull” (get code from) from a given GitHub URL into a local folder of your choosing.</a:t>
+            </a:r>
+          </a:p>
+          <a:p>
+            <a:r>
+              <a:rPr lang="en-US" dirty="0"/>
+              <a:t>The concept of Git is that you have a local key (for each computer) and a remote key (on your GitHub account) which are linked together so GitHub knows who you are.</a:t>
             </a:r>
           </a:p>
         </p:txBody>
@@ -5654,7 +6669,1326 @@
     </p:spTree>
     <p:extLst>
       <p:ext uri="{BB962C8B-B14F-4D97-AF65-F5344CB8AC3E}">
-        <p14:creationId xmlns:p14="http://schemas.microsoft.com/office/powerpoint/2010/main" val="4163278239"/>
+        <p14:creationId xmlns:p14="http://schemas.microsoft.com/office/powerpoint/2010/main" val="382696903"/>
+      </p:ext>
+    </p:extLst>
+  </p:cSld>
+  <p:clrMapOvr>
+    <a:masterClrMapping/>
+  </p:clrMapOvr>
+</p:sld>
+</file>
+
+<file path=ppt/slides/slide5.xml><?xml version="1.0" encoding="utf-8"?>
+<p:sld xmlns:a="http://schemas.openxmlformats.org/drawingml/2006/main" xmlns:r="http://schemas.openxmlformats.org/officeDocument/2006/relationships" xmlns:p="http://schemas.openxmlformats.org/presentationml/2006/main">
+  <p:cSld>
+    <p:bg>
+      <p:bgPr>
+        <a:solidFill>
+          <a:schemeClr val="bg1"/>
+        </a:solidFill>
+        <a:effectLst/>
+      </p:bgPr>
+    </p:bg>
+    <p:spTree>
+      <p:nvGrpSpPr>
+        <p:cNvPr id="1" name=""/>
+        <p:cNvGrpSpPr/>
+        <p:nvPr/>
+      </p:nvGrpSpPr>
+      <p:grpSpPr>
+        <a:xfrm>
+          <a:off x="0" y="0"/>
+          <a:ext cx="0" cy="0"/>
+          <a:chOff x="0" y="0"/>
+          <a:chExt cx="0" cy="0"/>
+        </a:xfrm>
+      </p:grpSpPr>
+      <p:sp useBgFill="1">
+        <p:nvSpPr>
+          <p:cNvPr id="9" name="Slide Background">
+            <a:extLst>
+              <a:ext uri="{FF2B5EF4-FFF2-40B4-BE49-F238E27FC236}">
+                <a16:creationId xmlns:a16="http://schemas.microsoft.com/office/drawing/2014/main" id="{9E6671AF-110C-4E4D-BEB4-1323A3136D1B}"/>
+              </a:ext>
+              <a:ext uri="{C183D7F6-B498-43B3-948B-1728B52AA6E4}">
+                <adec:decorative xmlns:adec="http://schemas.microsoft.com/office/drawing/2017/decorative" val="1"/>
+              </a:ext>
+            </a:extLst>
+          </p:cNvPr>
+          <p:cNvSpPr>
+            <a:spLocks noGrp="1" noRot="1" noChangeAspect="1" noMove="1" noResize="1" noEditPoints="1" noAdjustHandles="1" noChangeArrowheads="1" noChangeShapeType="1" noTextEdit="1"/>
+          </p:cNvSpPr>
+          <p:nvPr>
+            <p:extLst>
+              <p:ext uri="{386F3935-93C4-4BCD-93E2-E3B085C9AB24}">
+                <p16:designElem xmlns:p16="http://schemas.microsoft.com/office/powerpoint/2015/main" val="1"/>
+              </p:ext>
+            </p:extLst>
+          </p:nvPr>
+        </p:nvSpPr>
+        <p:spPr>
+          <a:xfrm>
+            <a:off x="0" y="0"/>
+            <a:ext cx="12192000" cy="6858000"/>
+          </a:xfrm>
+          <a:prstGeom prst="rect">
+            <a:avLst/>
+          </a:prstGeom>
+          <a:ln>
+            <a:noFill/>
+          </a:ln>
+        </p:spPr>
+        <p:style>
+          <a:lnRef idx="2">
+            <a:schemeClr val="accent1">
+              <a:shade val="50000"/>
+            </a:schemeClr>
+          </a:lnRef>
+          <a:fillRef idx="1">
+            <a:schemeClr val="accent1"/>
+          </a:fillRef>
+          <a:effectRef idx="0">
+            <a:schemeClr val="accent1"/>
+          </a:effectRef>
+          <a:fontRef idx="minor">
+            <a:schemeClr val="lt1"/>
+          </a:fontRef>
+        </p:style>
+        <p:txBody>
+          <a:bodyPr rtlCol="0" anchor="ctr"/>
+          <a:lstStyle/>
+          <a:p>
+            <a:pPr algn="ctr"/>
+            <a:endParaRPr lang="en-US"/>
+          </a:p>
+        </p:txBody>
+      </p:sp>
+      <p:sp>
+        <p:nvSpPr>
+          <p:cNvPr id="2" name="Title 1">
+            <a:extLst>
+              <a:ext uri="{FF2B5EF4-FFF2-40B4-BE49-F238E27FC236}">
+                <a16:creationId xmlns:a16="http://schemas.microsoft.com/office/drawing/2014/main" id="{EDB18783-6505-3F7B-A4F9-B95527103F80}"/>
+              </a:ext>
+            </a:extLst>
+          </p:cNvPr>
+          <p:cNvSpPr>
+            <a:spLocks noGrp="1"/>
+          </p:cNvSpPr>
+          <p:nvPr>
+            <p:ph type="title"/>
+          </p:nvPr>
+        </p:nvSpPr>
+        <p:spPr>
+          <a:xfrm>
+            <a:off x="761802" y="310895"/>
+            <a:ext cx="4889190" cy="2121408"/>
+          </a:xfrm>
+        </p:spPr>
+        <p:txBody>
+          <a:bodyPr anchor="ctr">
+            <a:normAutofit/>
+          </a:bodyPr>
+          <a:lstStyle/>
+          <a:p>
+            <a:r>
+              <a:rPr lang="en-US" sz="3400" dirty="0"/>
+              <a:t>How to use </a:t>
+            </a:r>
+            <a:r>
+              <a:rPr lang="en-US" sz="3400" dirty="0" err="1"/>
+              <a:t>common_code</a:t>
+            </a:r>
+            <a:r>
+              <a:rPr lang="en-US" sz="3400" dirty="0"/>
+              <a:t>: (2) Forking the </a:t>
+            </a:r>
+            <a:r>
+              <a:rPr lang="en-US" sz="3400" dirty="0" err="1"/>
+              <a:t>common_code</a:t>
+            </a:r>
+            <a:r>
+              <a:rPr lang="en-US" sz="3400" dirty="0"/>
+              <a:t> repo to your GitHub account</a:t>
+            </a:r>
+          </a:p>
+        </p:txBody>
+      </p:sp>
+      <p:sp>
+        <p:nvSpPr>
+          <p:cNvPr id="3" name="Content Placeholder 2">
+            <a:extLst>
+              <a:ext uri="{FF2B5EF4-FFF2-40B4-BE49-F238E27FC236}">
+                <a16:creationId xmlns:a16="http://schemas.microsoft.com/office/drawing/2014/main" id="{54913A8F-A480-6F25-74F8-3B0623EE4445}"/>
+              </a:ext>
+            </a:extLst>
+          </p:cNvPr>
+          <p:cNvSpPr>
+            <a:spLocks noGrp="1"/>
+          </p:cNvSpPr>
+          <p:nvPr>
+            <p:ph idx="1"/>
+          </p:nvPr>
+        </p:nvSpPr>
+        <p:spPr>
+          <a:xfrm>
+            <a:off x="6108878" y="310896"/>
+            <a:ext cx="5257800" cy="2121407"/>
+          </a:xfrm>
+        </p:spPr>
+        <p:txBody>
+          <a:bodyPr anchor="ctr">
+            <a:normAutofit fontScale="92500" lnSpcReduction="10000"/>
+          </a:bodyPr>
+          <a:lstStyle/>
+          <a:p>
+            <a:r>
+              <a:rPr lang="en-US" sz="1700" dirty="0"/>
+              <a:t>“Forking” a repository (or “repo”) creates a copy of a package in your GitHub account that GitHub allows to be synced and compared with the original version</a:t>
+            </a:r>
+          </a:p>
+          <a:p>
+            <a:pPr lvl="1"/>
+            <a:r>
+              <a:rPr lang="en-US" sz="1700" dirty="0"/>
+              <a:t>If you ever want to make a </a:t>
+            </a:r>
+            <a:r>
+              <a:rPr lang="en-US" sz="1700" b="1" u="sng" dirty="0"/>
+              <a:t>SAFE</a:t>
+            </a:r>
+            <a:r>
+              <a:rPr lang="en-US" sz="1700" dirty="0"/>
+              <a:t> code upgrade suggestion in the future, this is necessary!</a:t>
+            </a:r>
+          </a:p>
+          <a:p>
+            <a:pPr lvl="1"/>
+            <a:r>
+              <a:rPr lang="en-US" sz="1700" dirty="0"/>
+              <a:t>You can use forks to propose upgrades or fixes to the code which can be reviewed by Ethan + Jordan</a:t>
+            </a:r>
+          </a:p>
+          <a:p>
+            <a:r>
+              <a:rPr lang="en-US" sz="1700" dirty="0"/>
+              <a:t>On the </a:t>
+            </a:r>
+            <a:r>
+              <a:rPr lang="en-US" sz="1700" dirty="0" err="1"/>
+              <a:t>common_code</a:t>
+            </a:r>
+            <a:r>
+              <a:rPr lang="en-US" sz="1700" dirty="0"/>
+              <a:t> GitHub page (see below), click “fork” </a:t>
+            </a:r>
+          </a:p>
+        </p:txBody>
+      </p:sp>
+      <p:pic>
+        <p:nvPicPr>
+          <p:cNvPr id="4" name="Picture 3" descr="A screenshot of a computer&#10;&#10;Description automatically generated">
+            <a:extLst>
+              <a:ext uri="{FF2B5EF4-FFF2-40B4-BE49-F238E27FC236}">
+                <a16:creationId xmlns:a16="http://schemas.microsoft.com/office/drawing/2014/main" id="{77DFAD72-0C9E-9405-2293-0ABE863DB572}"/>
+              </a:ext>
+            </a:extLst>
+          </p:cNvPr>
+          <p:cNvPicPr>
+            <a:picLocks noChangeAspect="1"/>
+          </p:cNvPicPr>
+          <p:nvPr/>
+        </p:nvPicPr>
+        <p:blipFill>
+          <a:blip r:embed="rId2"/>
+          <a:srcRect b="14557"/>
+          <a:stretch/>
+        </p:blipFill>
+        <p:spPr>
+          <a:xfrm>
+            <a:off x="20" y="2743201"/>
+            <a:ext cx="12191979" cy="4114799"/>
+          </a:xfrm>
+          <a:prstGeom prst="rect">
+            <a:avLst/>
+          </a:prstGeom>
+          <a:effectLst>
+            <a:innerShdw blurRad="190500" dist="127000" dir="16200000">
+              <a:prstClr val="black">
+                <a:alpha val="19000"/>
+              </a:prstClr>
+            </a:innerShdw>
+          </a:effectLst>
+        </p:spPr>
+      </p:pic>
+      <p:sp>
+        <p:nvSpPr>
+          <p:cNvPr id="5" name="Oval 4">
+            <a:extLst>
+              <a:ext uri="{FF2B5EF4-FFF2-40B4-BE49-F238E27FC236}">
+                <a16:creationId xmlns:a16="http://schemas.microsoft.com/office/drawing/2014/main" id="{0DC6BCAF-7101-0367-61D8-CC454CAFBF64}"/>
+              </a:ext>
+            </a:extLst>
+          </p:cNvPr>
+          <p:cNvSpPr/>
+          <p:nvPr/>
+        </p:nvSpPr>
+        <p:spPr>
+          <a:xfrm>
+            <a:off x="8565266" y="3429000"/>
+            <a:ext cx="1412111" cy="946230"/>
+          </a:xfrm>
+          <a:prstGeom prst="ellipse">
+            <a:avLst/>
+          </a:prstGeom>
+          <a:noFill/>
+          <a:ln>
+            <a:solidFill>
+              <a:srgbClr val="FF0000"/>
+            </a:solidFill>
+          </a:ln>
+        </p:spPr>
+        <p:style>
+          <a:lnRef idx="2">
+            <a:schemeClr val="accent1">
+              <a:shade val="15000"/>
+            </a:schemeClr>
+          </a:lnRef>
+          <a:fillRef idx="1">
+            <a:schemeClr val="accent1"/>
+          </a:fillRef>
+          <a:effectRef idx="0">
+            <a:schemeClr val="accent1"/>
+          </a:effectRef>
+          <a:fontRef idx="minor">
+            <a:schemeClr val="lt1"/>
+          </a:fontRef>
+        </p:style>
+        <p:txBody>
+          <a:bodyPr rtlCol="0" anchor="ctr"/>
+          <a:lstStyle/>
+          <a:p>
+            <a:pPr algn="ctr"/>
+            <a:endParaRPr lang="en-US"/>
+          </a:p>
+        </p:txBody>
+      </p:sp>
+    </p:spTree>
+    <p:extLst>
+      <p:ext uri="{BB962C8B-B14F-4D97-AF65-F5344CB8AC3E}">
+        <p14:creationId xmlns:p14="http://schemas.microsoft.com/office/powerpoint/2010/main" val="1544505765"/>
+      </p:ext>
+    </p:extLst>
+  </p:cSld>
+  <p:clrMapOvr>
+    <a:masterClrMapping/>
+  </p:clrMapOvr>
+</p:sld>
+</file>
+
+<file path=ppt/slides/slide6.xml><?xml version="1.0" encoding="utf-8"?>
+<p:sld xmlns:a="http://schemas.openxmlformats.org/drawingml/2006/main" xmlns:r="http://schemas.openxmlformats.org/officeDocument/2006/relationships" xmlns:p="http://schemas.openxmlformats.org/presentationml/2006/main">
+  <p:cSld>
+    <p:spTree>
+      <p:nvGrpSpPr>
+        <p:cNvPr id="1" name=""/>
+        <p:cNvGrpSpPr/>
+        <p:nvPr/>
+      </p:nvGrpSpPr>
+      <p:grpSpPr>
+        <a:xfrm>
+          <a:off x="0" y="0"/>
+          <a:ext cx="0" cy="0"/>
+          <a:chOff x="0" y="0"/>
+          <a:chExt cx="0" cy="0"/>
+        </a:xfrm>
+      </p:grpSpPr>
+      <p:sp>
+        <p:nvSpPr>
+          <p:cNvPr id="2" name="Title 1">
+            <a:extLst>
+              <a:ext uri="{FF2B5EF4-FFF2-40B4-BE49-F238E27FC236}">
+                <a16:creationId xmlns:a16="http://schemas.microsoft.com/office/drawing/2014/main" id="{AB856AD5-3231-8F12-BBBF-21EE68320415}"/>
+              </a:ext>
+            </a:extLst>
+          </p:cNvPr>
+          <p:cNvSpPr>
+            <a:spLocks noGrp="1"/>
+          </p:cNvSpPr>
+          <p:nvPr>
+            <p:ph type="title"/>
+          </p:nvPr>
+        </p:nvSpPr>
+        <p:spPr/>
+        <p:txBody>
+          <a:bodyPr/>
+          <a:lstStyle/>
+          <a:p>
+            <a:r>
+              <a:rPr lang="en-US" sz="4400" dirty="0"/>
+              <a:t>How to use </a:t>
+            </a:r>
+            <a:r>
+              <a:rPr lang="en-US" sz="4400" dirty="0" err="1"/>
+              <a:t>common_code</a:t>
+            </a:r>
+            <a:r>
+              <a:rPr lang="en-US" sz="4400" dirty="0"/>
+              <a:t>: (2) Forking the </a:t>
+            </a:r>
+            <a:r>
+              <a:rPr lang="en-US" sz="4400" dirty="0" err="1"/>
+              <a:t>common_code</a:t>
+            </a:r>
+            <a:r>
+              <a:rPr lang="en-US" sz="4400" dirty="0"/>
+              <a:t> repo to your GitHub account</a:t>
+            </a:r>
+            <a:endParaRPr lang="en-US" dirty="0"/>
+          </a:p>
+        </p:txBody>
+      </p:sp>
+      <p:sp>
+        <p:nvSpPr>
+          <p:cNvPr id="3" name="Content Placeholder 2">
+            <a:extLst>
+              <a:ext uri="{FF2B5EF4-FFF2-40B4-BE49-F238E27FC236}">
+                <a16:creationId xmlns:a16="http://schemas.microsoft.com/office/drawing/2014/main" id="{452D8AB7-58A1-2C4F-5A49-6ABD1FF29D1C}"/>
+              </a:ext>
+            </a:extLst>
+          </p:cNvPr>
+          <p:cNvSpPr>
+            <a:spLocks noGrp="1"/>
+          </p:cNvSpPr>
+          <p:nvPr>
+            <p:ph idx="1"/>
+          </p:nvPr>
+        </p:nvSpPr>
+        <p:spPr/>
+        <p:txBody>
+          <a:bodyPr/>
+          <a:lstStyle/>
+          <a:p>
+            <a:r>
+              <a:rPr lang="en-US" dirty="0"/>
+              <a:t>Now if you go to “Your repositories”, you should see this:</a:t>
+            </a:r>
+          </a:p>
+        </p:txBody>
+      </p:sp>
+      <p:pic>
+        <p:nvPicPr>
+          <p:cNvPr id="4" name="Picture 3">
+            <a:extLst>
+              <a:ext uri="{FF2B5EF4-FFF2-40B4-BE49-F238E27FC236}">
+                <a16:creationId xmlns:a16="http://schemas.microsoft.com/office/drawing/2014/main" id="{256FA426-21BB-76DA-47D2-A12A498DA288}"/>
+              </a:ext>
+            </a:extLst>
+          </p:cNvPr>
+          <p:cNvPicPr>
+            <a:picLocks noChangeAspect="1"/>
+          </p:cNvPicPr>
+          <p:nvPr/>
+        </p:nvPicPr>
+        <p:blipFill>
+          <a:blip r:embed="rId2"/>
+          <a:stretch>
+            <a:fillRect/>
+          </a:stretch>
+        </p:blipFill>
+        <p:spPr>
+          <a:xfrm>
+            <a:off x="1159919" y="2967085"/>
+            <a:ext cx="9872162" cy="3890915"/>
+          </a:xfrm>
+          <a:prstGeom prst="rect">
+            <a:avLst/>
+          </a:prstGeom>
+        </p:spPr>
+      </p:pic>
+      <p:sp>
+        <p:nvSpPr>
+          <p:cNvPr id="5" name="Oval 4">
+            <a:extLst>
+              <a:ext uri="{FF2B5EF4-FFF2-40B4-BE49-F238E27FC236}">
+                <a16:creationId xmlns:a16="http://schemas.microsoft.com/office/drawing/2014/main" id="{6485CF04-BDDD-748F-D2BB-33352474C681}"/>
+              </a:ext>
+            </a:extLst>
+          </p:cNvPr>
+          <p:cNvSpPr/>
+          <p:nvPr/>
+        </p:nvSpPr>
+        <p:spPr>
+          <a:xfrm>
+            <a:off x="3622876" y="4100330"/>
+            <a:ext cx="2473124" cy="1258747"/>
+          </a:xfrm>
+          <a:prstGeom prst="ellipse">
+            <a:avLst/>
+          </a:prstGeom>
+          <a:noFill/>
+          <a:ln>
+            <a:solidFill>
+              <a:srgbClr val="FF0000"/>
+            </a:solidFill>
+          </a:ln>
+        </p:spPr>
+        <p:style>
+          <a:lnRef idx="2">
+            <a:schemeClr val="accent1">
+              <a:shade val="15000"/>
+            </a:schemeClr>
+          </a:lnRef>
+          <a:fillRef idx="1">
+            <a:schemeClr val="accent1"/>
+          </a:fillRef>
+          <a:effectRef idx="0">
+            <a:schemeClr val="accent1"/>
+          </a:effectRef>
+          <a:fontRef idx="minor">
+            <a:schemeClr val="lt1"/>
+          </a:fontRef>
+        </p:style>
+        <p:txBody>
+          <a:bodyPr rtlCol="0" anchor="ctr"/>
+          <a:lstStyle/>
+          <a:p>
+            <a:pPr algn="ctr"/>
+            <a:endParaRPr lang="en-US"/>
+          </a:p>
+        </p:txBody>
+      </p:sp>
+    </p:spTree>
+    <p:extLst>
+      <p:ext uri="{BB962C8B-B14F-4D97-AF65-F5344CB8AC3E}">
+        <p14:creationId xmlns:p14="http://schemas.microsoft.com/office/powerpoint/2010/main" val="502210255"/>
+      </p:ext>
+    </p:extLst>
+  </p:cSld>
+  <p:clrMapOvr>
+    <a:masterClrMapping/>
+  </p:clrMapOvr>
+</p:sld>
+</file>
+
+<file path=ppt/slides/slide7.xml><?xml version="1.0" encoding="utf-8"?>
+<p:sld xmlns:a="http://schemas.openxmlformats.org/drawingml/2006/main" xmlns:r="http://schemas.openxmlformats.org/officeDocument/2006/relationships" xmlns:p="http://schemas.openxmlformats.org/presentationml/2006/main">
+  <p:cSld>
+    <p:spTree>
+      <p:nvGrpSpPr>
+        <p:cNvPr id="1" name="">
+          <a:extLst>
+            <a:ext uri="{FF2B5EF4-FFF2-40B4-BE49-F238E27FC236}">
+              <a16:creationId xmlns:a16="http://schemas.microsoft.com/office/drawing/2014/main" id="{F2AAC557-2697-8B99-3B5C-658FCCDC3EE8}"/>
+            </a:ext>
+          </a:extLst>
+        </p:cNvPr>
+        <p:cNvGrpSpPr/>
+        <p:nvPr/>
+      </p:nvGrpSpPr>
+      <p:grpSpPr>
+        <a:xfrm>
+          <a:off x="0" y="0"/>
+          <a:ext cx="0" cy="0"/>
+          <a:chOff x="0" y="0"/>
+          <a:chExt cx="0" cy="0"/>
+        </a:xfrm>
+      </p:grpSpPr>
+      <p:sp>
+        <p:nvSpPr>
+          <p:cNvPr id="2" name="Title 1">
+            <a:extLst>
+              <a:ext uri="{FF2B5EF4-FFF2-40B4-BE49-F238E27FC236}">
+                <a16:creationId xmlns:a16="http://schemas.microsoft.com/office/drawing/2014/main" id="{67A0BA40-AE72-B8B8-B255-93E6BA1BA8F6}"/>
+              </a:ext>
+            </a:extLst>
+          </p:cNvPr>
+          <p:cNvSpPr>
+            <a:spLocks noGrp="1"/>
+          </p:cNvSpPr>
+          <p:nvPr>
+            <p:ph type="title"/>
+          </p:nvPr>
+        </p:nvSpPr>
+        <p:spPr/>
+        <p:txBody>
+          <a:bodyPr/>
+          <a:lstStyle/>
+          <a:p>
+            <a:r>
+              <a:rPr lang="en-US" sz="4400" dirty="0"/>
+              <a:t>How to use </a:t>
+            </a:r>
+            <a:r>
+              <a:rPr lang="en-US" sz="4400" dirty="0" err="1"/>
+              <a:t>common_code</a:t>
+            </a:r>
+            <a:r>
+              <a:rPr lang="en-US" sz="4400" dirty="0"/>
+              <a:t>: (2) Forking the </a:t>
+            </a:r>
+            <a:r>
+              <a:rPr lang="en-US" sz="4400" dirty="0" err="1"/>
+              <a:t>common_code</a:t>
+            </a:r>
+            <a:r>
+              <a:rPr lang="en-US" sz="4400" dirty="0"/>
+              <a:t> repo to your GitHub account</a:t>
+            </a:r>
+            <a:endParaRPr lang="en-US" dirty="0"/>
+          </a:p>
+        </p:txBody>
+      </p:sp>
+      <p:sp>
+        <p:nvSpPr>
+          <p:cNvPr id="3" name="Content Placeholder 2">
+            <a:extLst>
+              <a:ext uri="{FF2B5EF4-FFF2-40B4-BE49-F238E27FC236}">
+                <a16:creationId xmlns:a16="http://schemas.microsoft.com/office/drawing/2014/main" id="{6EBF2917-0311-E7CB-F341-0EEFDB956771}"/>
+              </a:ext>
+            </a:extLst>
+          </p:cNvPr>
+          <p:cNvSpPr>
+            <a:spLocks noGrp="1"/>
+          </p:cNvSpPr>
+          <p:nvPr>
+            <p:ph idx="1"/>
+          </p:nvPr>
+        </p:nvSpPr>
+        <p:spPr/>
+        <p:txBody>
+          <a:bodyPr/>
+          <a:lstStyle/>
+          <a:p>
+            <a:r>
+              <a:rPr lang="en-US" dirty="0"/>
+              <a:t>Every now and then, the owners of </a:t>
+            </a:r>
+            <a:r>
+              <a:rPr lang="en-US" dirty="0" err="1"/>
+              <a:t>common_code</a:t>
+            </a:r>
+            <a:r>
+              <a:rPr lang="en-US" dirty="0"/>
+              <a:t> will update the package with some edits, new files, etc.</a:t>
+            </a:r>
+          </a:p>
+          <a:p>
+            <a:r>
+              <a:rPr lang="en-US" dirty="0"/>
+              <a:t>Your forked version of the code will </a:t>
+            </a:r>
+            <a:r>
+              <a:rPr lang="en-US" b="1" u="sng" dirty="0"/>
+              <a:t>NOT</a:t>
+            </a:r>
+            <a:r>
+              <a:rPr lang="en-US" dirty="0"/>
+              <a:t> automatically sync with the owners’ version!</a:t>
+            </a:r>
+          </a:p>
+          <a:p>
+            <a:r>
+              <a:rPr lang="en-US" dirty="0"/>
+              <a:t>So, you will need to occasionally check for updates</a:t>
+            </a:r>
+          </a:p>
+        </p:txBody>
+      </p:sp>
+    </p:spTree>
+    <p:extLst>
+      <p:ext uri="{BB962C8B-B14F-4D97-AF65-F5344CB8AC3E}">
+        <p14:creationId xmlns:p14="http://schemas.microsoft.com/office/powerpoint/2010/main" val="3337945388"/>
+      </p:ext>
+    </p:extLst>
+  </p:cSld>
+  <p:clrMapOvr>
+    <a:masterClrMapping/>
+  </p:clrMapOvr>
+</p:sld>
+</file>
+
+<file path=ppt/slides/slide8.xml><?xml version="1.0" encoding="utf-8"?>
+<p:sld xmlns:a="http://schemas.openxmlformats.org/drawingml/2006/main" xmlns:r="http://schemas.openxmlformats.org/officeDocument/2006/relationships" xmlns:p="http://schemas.openxmlformats.org/presentationml/2006/main">
+  <p:cSld>
+    <p:spTree>
+      <p:nvGrpSpPr>
+        <p:cNvPr id="1" name="">
+          <a:extLst>
+            <a:ext uri="{FF2B5EF4-FFF2-40B4-BE49-F238E27FC236}">
+              <a16:creationId xmlns:a16="http://schemas.microsoft.com/office/drawing/2014/main" id="{481DA312-5BD5-7A79-B6C5-4ECEE4D371F7}"/>
+            </a:ext>
+          </a:extLst>
+        </p:cNvPr>
+        <p:cNvGrpSpPr/>
+        <p:nvPr/>
+      </p:nvGrpSpPr>
+      <p:grpSpPr>
+        <a:xfrm>
+          <a:off x="0" y="0"/>
+          <a:ext cx="0" cy="0"/>
+          <a:chOff x="0" y="0"/>
+          <a:chExt cx="0" cy="0"/>
+        </a:xfrm>
+      </p:grpSpPr>
+      <p:sp>
+        <p:nvSpPr>
+          <p:cNvPr id="2" name="Title 1">
+            <a:extLst>
+              <a:ext uri="{FF2B5EF4-FFF2-40B4-BE49-F238E27FC236}">
+                <a16:creationId xmlns:a16="http://schemas.microsoft.com/office/drawing/2014/main" id="{C56BCF10-5BC9-6FD5-0274-CDAF98A48B1B}"/>
+              </a:ext>
+            </a:extLst>
+          </p:cNvPr>
+          <p:cNvSpPr>
+            <a:spLocks noGrp="1"/>
+          </p:cNvSpPr>
+          <p:nvPr>
+            <p:ph type="title"/>
+          </p:nvPr>
+        </p:nvSpPr>
+        <p:spPr/>
+        <p:txBody>
+          <a:bodyPr/>
+          <a:lstStyle/>
+          <a:p>
+            <a:r>
+              <a:rPr lang="en-US" sz="4400" dirty="0"/>
+              <a:t>How to use </a:t>
+            </a:r>
+            <a:r>
+              <a:rPr lang="en-US" sz="4400" dirty="0" err="1"/>
+              <a:t>common_code</a:t>
+            </a:r>
+            <a:r>
+              <a:rPr lang="en-US" sz="4400" dirty="0"/>
+              <a:t>: (2) Forking the </a:t>
+            </a:r>
+            <a:r>
+              <a:rPr lang="en-US" sz="4400" dirty="0" err="1"/>
+              <a:t>common_code</a:t>
+            </a:r>
+            <a:r>
+              <a:rPr lang="en-US" sz="4400" dirty="0"/>
+              <a:t> repo to your GitHub account</a:t>
+            </a:r>
+            <a:endParaRPr lang="en-US" dirty="0"/>
+          </a:p>
+        </p:txBody>
+      </p:sp>
+      <p:sp>
+        <p:nvSpPr>
+          <p:cNvPr id="3" name="Content Placeholder 2">
+            <a:extLst>
+              <a:ext uri="{FF2B5EF4-FFF2-40B4-BE49-F238E27FC236}">
+                <a16:creationId xmlns:a16="http://schemas.microsoft.com/office/drawing/2014/main" id="{F66D0921-D6E1-9856-30FD-388145ED1443}"/>
+              </a:ext>
+            </a:extLst>
+          </p:cNvPr>
+          <p:cNvSpPr>
+            <a:spLocks noGrp="1"/>
+          </p:cNvSpPr>
+          <p:nvPr>
+            <p:ph idx="1"/>
+          </p:nvPr>
+        </p:nvSpPr>
+        <p:spPr/>
+        <p:txBody>
+          <a:bodyPr/>
+          <a:lstStyle/>
+          <a:p>
+            <a:r>
+              <a:rPr lang="en-US" dirty="0"/>
+              <a:t>Here is what my forked version of </a:t>
+            </a:r>
+            <a:r>
+              <a:rPr lang="en-US" dirty="0" err="1"/>
+              <a:t>common_code</a:t>
+            </a:r>
+            <a:r>
+              <a:rPr lang="en-US" dirty="0"/>
+              <a:t> looks like:</a:t>
+            </a:r>
+          </a:p>
+        </p:txBody>
+      </p:sp>
+      <p:pic>
+        <p:nvPicPr>
+          <p:cNvPr id="4" name="Picture 3">
+            <a:extLst>
+              <a:ext uri="{FF2B5EF4-FFF2-40B4-BE49-F238E27FC236}">
+                <a16:creationId xmlns:a16="http://schemas.microsoft.com/office/drawing/2014/main" id="{6ABAB3C3-93D8-2059-BD84-1D4B26D22644}"/>
+              </a:ext>
+            </a:extLst>
+          </p:cNvPr>
+          <p:cNvPicPr>
+            <a:picLocks noChangeAspect="1"/>
+          </p:cNvPicPr>
+          <p:nvPr/>
+        </p:nvPicPr>
+        <p:blipFill>
+          <a:blip r:embed="rId3"/>
+          <a:stretch>
+            <a:fillRect/>
+          </a:stretch>
+        </p:blipFill>
+        <p:spPr>
+          <a:xfrm>
+            <a:off x="4314423" y="2615496"/>
+            <a:ext cx="7772400" cy="2771595"/>
+          </a:xfrm>
+          <a:prstGeom prst="rect">
+            <a:avLst/>
+          </a:prstGeom>
+        </p:spPr>
+      </p:pic>
+      <p:sp>
+        <p:nvSpPr>
+          <p:cNvPr id="5" name="Rectangle 4">
+            <a:extLst>
+              <a:ext uri="{FF2B5EF4-FFF2-40B4-BE49-F238E27FC236}">
+                <a16:creationId xmlns:a16="http://schemas.microsoft.com/office/drawing/2014/main" id="{B72AD5D0-F334-544D-8953-E3C71AC2450B}"/>
+              </a:ext>
+            </a:extLst>
+          </p:cNvPr>
+          <p:cNvSpPr/>
+          <p:nvPr/>
+        </p:nvSpPr>
+        <p:spPr>
+          <a:xfrm>
+            <a:off x="4912066" y="4001293"/>
+            <a:ext cx="4798711" cy="283540"/>
+          </a:xfrm>
+          <a:prstGeom prst="rect">
+            <a:avLst/>
+          </a:prstGeom>
+          <a:noFill/>
+          <a:ln>
+            <a:solidFill>
+              <a:srgbClr val="FF0000"/>
+            </a:solidFill>
+          </a:ln>
+        </p:spPr>
+        <p:style>
+          <a:lnRef idx="2">
+            <a:schemeClr val="accent1">
+              <a:shade val="15000"/>
+            </a:schemeClr>
+          </a:lnRef>
+          <a:fillRef idx="1">
+            <a:schemeClr val="accent1"/>
+          </a:fillRef>
+          <a:effectRef idx="0">
+            <a:schemeClr val="accent1"/>
+          </a:effectRef>
+          <a:fontRef idx="minor">
+            <a:schemeClr val="lt1"/>
+          </a:fontRef>
+        </p:style>
+        <p:txBody>
+          <a:bodyPr rtlCol="0" anchor="ctr"/>
+          <a:lstStyle/>
+          <a:p>
+            <a:pPr algn="ctr"/>
+            <a:endParaRPr lang="en-US"/>
+          </a:p>
+        </p:txBody>
+      </p:sp>
+      <p:sp>
+        <p:nvSpPr>
+          <p:cNvPr id="6" name="TextBox 5">
+            <a:extLst>
+              <a:ext uri="{FF2B5EF4-FFF2-40B4-BE49-F238E27FC236}">
+                <a16:creationId xmlns:a16="http://schemas.microsoft.com/office/drawing/2014/main" id="{C92128A0-F798-1169-5D5E-317BE40F8F82}"/>
+              </a:ext>
+            </a:extLst>
+          </p:cNvPr>
+          <p:cNvSpPr txBox="1"/>
+          <p:nvPr/>
+        </p:nvSpPr>
+        <p:spPr>
+          <a:xfrm>
+            <a:off x="377831" y="3059668"/>
+            <a:ext cx="3462615" cy="369332"/>
+          </a:xfrm>
+          <a:prstGeom prst="rect">
+            <a:avLst/>
+          </a:prstGeom>
+          <a:noFill/>
+          <a:ln w="28575">
+            <a:solidFill>
+              <a:srgbClr val="FF0000"/>
+            </a:solidFill>
+          </a:ln>
+        </p:spPr>
+        <p:txBody>
+          <a:bodyPr wrap="none" rtlCol="0">
+            <a:spAutoFit/>
+          </a:bodyPr>
+          <a:lstStyle/>
+          <a:p>
+            <a:r>
+              <a:rPr lang="en-US" b="1" i="1" dirty="0">
+                <a:solidFill>
+                  <a:srgbClr val="FF0000"/>
+                </a:solidFill>
+              </a:rPr>
+              <a:t>In my forked version of the repo</a:t>
+            </a:r>
+          </a:p>
+        </p:txBody>
+      </p:sp>
+      <p:sp>
+        <p:nvSpPr>
+          <p:cNvPr id="7" name="Rectangle 6">
+            <a:extLst>
+              <a:ext uri="{FF2B5EF4-FFF2-40B4-BE49-F238E27FC236}">
+                <a16:creationId xmlns:a16="http://schemas.microsoft.com/office/drawing/2014/main" id="{46501847-9798-ADFB-7F98-FD9B102B6349}"/>
+              </a:ext>
+            </a:extLst>
+          </p:cNvPr>
+          <p:cNvSpPr/>
+          <p:nvPr/>
+        </p:nvSpPr>
+        <p:spPr>
+          <a:xfrm>
+            <a:off x="4834971" y="3218263"/>
+            <a:ext cx="1261029" cy="384907"/>
+          </a:xfrm>
+          <a:prstGeom prst="rect">
+            <a:avLst/>
+          </a:prstGeom>
+          <a:noFill/>
+          <a:ln>
+            <a:solidFill>
+              <a:srgbClr val="FF0000"/>
+            </a:solidFill>
+          </a:ln>
+        </p:spPr>
+        <p:style>
+          <a:lnRef idx="2">
+            <a:schemeClr val="accent1">
+              <a:shade val="15000"/>
+            </a:schemeClr>
+          </a:lnRef>
+          <a:fillRef idx="1">
+            <a:schemeClr val="accent1"/>
+          </a:fillRef>
+          <a:effectRef idx="0">
+            <a:schemeClr val="accent1"/>
+          </a:effectRef>
+          <a:fontRef idx="minor">
+            <a:schemeClr val="lt1"/>
+          </a:fontRef>
+        </p:style>
+        <p:txBody>
+          <a:bodyPr rtlCol="0" anchor="ctr"/>
+          <a:lstStyle/>
+          <a:p>
+            <a:pPr algn="ctr"/>
+            <a:endParaRPr lang="en-US"/>
+          </a:p>
+        </p:txBody>
+      </p:sp>
+      <p:sp>
+        <p:nvSpPr>
+          <p:cNvPr id="8" name="TextBox 7">
+            <a:extLst>
+              <a:ext uri="{FF2B5EF4-FFF2-40B4-BE49-F238E27FC236}">
+                <a16:creationId xmlns:a16="http://schemas.microsoft.com/office/drawing/2014/main" id="{CA82E466-50C9-57C7-6438-C1DF554D882D}"/>
+              </a:ext>
+            </a:extLst>
+          </p:cNvPr>
+          <p:cNvSpPr txBox="1"/>
+          <p:nvPr/>
+        </p:nvSpPr>
+        <p:spPr>
+          <a:xfrm>
+            <a:off x="322153" y="4095382"/>
+            <a:ext cx="2906486" cy="923330"/>
+          </a:xfrm>
+          <a:prstGeom prst="rect">
+            <a:avLst/>
+          </a:prstGeom>
+          <a:noFill/>
+          <a:ln w="28575">
+            <a:solidFill>
+              <a:srgbClr val="FF0000"/>
+            </a:solidFill>
+          </a:ln>
+        </p:spPr>
+        <p:txBody>
+          <a:bodyPr wrap="square" rtlCol="0">
+            <a:spAutoFit/>
+          </a:bodyPr>
+          <a:lstStyle/>
+          <a:p>
+            <a:r>
+              <a:rPr lang="en-US" b="1" i="1" dirty="0">
+                <a:solidFill>
+                  <a:srgbClr val="FF0000"/>
+                </a:solidFill>
+              </a:rPr>
+              <a:t>The </a:t>
+            </a:r>
+            <a:r>
+              <a:rPr lang="en-US" b="1" i="1" u="sng" dirty="0">
+                <a:solidFill>
+                  <a:srgbClr val="FF0000"/>
+                </a:solidFill>
+              </a:rPr>
+              <a:t>main branch</a:t>
+            </a:r>
+            <a:r>
+              <a:rPr lang="en-US" b="1" i="1" dirty="0">
+                <a:solidFill>
+                  <a:srgbClr val="FF0000"/>
+                </a:solidFill>
+              </a:rPr>
+              <a:t> of my fork is up to date with Jordan’s</a:t>
+            </a:r>
+          </a:p>
+        </p:txBody>
+      </p:sp>
+      <p:cxnSp>
+        <p:nvCxnSpPr>
+          <p:cNvPr id="10" name="Straight Arrow Connector 9">
+            <a:extLst>
+              <a:ext uri="{FF2B5EF4-FFF2-40B4-BE49-F238E27FC236}">
+                <a16:creationId xmlns:a16="http://schemas.microsoft.com/office/drawing/2014/main" id="{7E04D328-8060-999A-1C7A-1C0C32C15500}"/>
+              </a:ext>
+            </a:extLst>
+          </p:cNvPr>
+          <p:cNvCxnSpPr>
+            <a:cxnSpLocks/>
+            <a:stCxn id="6" idx="3"/>
+          </p:cNvCxnSpPr>
+          <p:nvPr/>
+        </p:nvCxnSpPr>
+        <p:spPr>
+          <a:xfrm>
+            <a:off x="3840446" y="3244334"/>
+            <a:ext cx="994525" cy="184666"/>
+          </a:xfrm>
+          <a:prstGeom prst="straightConnector1">
+            <a:avLst/>
+          </a:prstGeom>
+          <a:ln w="28575">
+            <a:solidFill>
+              <a:srgbClr val="FF0000"/>
+            </a:solidFill>
+            <a:tailEnd type="triangle"/>
+          </a:ln>
+        </p:spPr>
+        <p:style>
+          <a:lnRef idx="2">
+            <a:schemeClr val="accent1"/>
+          </a:lnRef>
+          <a:fillRef idx="0">
+            <a:schemeClr val="accent1"/>
+          </a:fillRef>
+          <a:effectRef idx="1">
+            <a:schemeClr val="accent1"/>
+          </a:effectRef>
+          <a:fontRef idx="minor">
+            <a:schemeClr val="tx1"/>
+          </a:fontRef>
+        </p:style>
+      </p:cxnSp>
+      <p:cxnSp>
+        <p:nvCxnSpPr>
+          <p:cNvPr id="11" name="Straight Arrow Connector 10">
+            <a:extLst>
+              <a:ext uri="{FF2B5EF4-FFF2-40B4-BE49-F238E27FC236}">
+                <a16:creationId xmlns:a16="http://schemas.microsoft.com/office/drawing/2014/main" id="{AB6684B1-C28D-C653-CF1A-D40A246D31CE}"/>
+              </a:ext>
+            </a:extLst>
+          </p:cNvPr>
+          <p:cNvCxnSpPr>
+            <a:cxnSpLocks/>
+          </p:cNvCxnSpPr>
+          <p:nvPr/>
+        </p:nvCxnSpPr>
+        <p:spPr>
+          <a:xfrm flipV="1">
+            <a:off x="3243629" y="4143063"/>
+            <a:ext cx="1668437" cy="427647"/>
+          </a:xfrm>
+          <a:prstGeom prst="straightConnector1">
+            <a:avLst/>
+          </a:prstGeom>
+          <a:ln w="28575">
+            <a:solidFill>
+              <a:srgbClr val="FF0000"/>
+            </a:solidFill>
+            <a:tailEnd type="triangle"/>
+          </a:ln>
+        </p:spPr>
+        <p:style>
+          <a:lnRef idx="2">
+            <a:schemeClr val="accent1"/>
+          </a:lnRef>
+          <a:fillRef idx="0">
+            <a:schemeClr val="accent1"/>
+          </a:fillRef>
+          <a:effectRef idx="1">
+            <a:schemeClr val="accent1"/>
+          </a:effectRef>
+          <a:fontRef idx="minor">
+            <a:schemeClr val="tx1"/>
+          </a:fontRef>
+        </p:style>
+      </p:cxnSp>
+    </p:spTree>
+    <p:extLst>
+      <p:ext uri="{BB962C8B-B14F-4D97-AF65-F5344CB8AC3E}">
+        <p14:creationId xmlns:p14="http://schemas.microsoft.com/office/powerpoint/2010/main" val="1463177867"/>
+      </p:ext>
+    </p:extLst>
+  </p:cSld>
+  <p:clrMapOvr>
+    <a:masterClrMapping/>
+  </p:clrMapOvr>
+</p:sld>
+</file>
+
+<file path=ppt/slides/slide9.xml><?xml version="1.0" encoding="utf-8"?>
+<p:sld xmlns:a="http://schemas.openxmlformats.org/drawingml/2006/main" xmlns:r="http://schemas.openxmlformats.org/officeDocument/2006/relationships" xmlns:p="http://schemas.openxmlformats.org/presentationml/2006/main">
+  <p:cSld>
+    <p:spTree>
+      <p:nvGrpSpPr>
+        <p:cNvPr id="1" name=""/>
+        <p:cNvGrpSpPr/>
+        <p:nvPr/>
+      </p:nvGrpSpPr>
+      <p:grpSpPr>
+        <a:xfrm>
+          <a:off x="0" y="0"/>
+          <a:ext cx="0" cy="0"/>
+          <a:chOff x="0" y="0"/>
+          <a:chExt cx="0" cy="0"/>
+        </a:xfrm>
+      </p:grpSpPr>
+      <p:sp>
+        <p:nvSpPr>
+          <p:cNvPr id="2" name="Title 1">
+            <a:extLst>
+              <a:ext uri="{FF2B5EF4-FFF2-40B4-BE49-F238E27FC236}">
+                <a16:creationId xmlns:a16="http://schemas.microsoft.com/office/drawing/2014/main" id="{571A6E84-E07D-6D05-8895-0D6ED0C07EF2}"/>
+              </a:ext>
+            </a:extLst>
+          </p:cNvPr>
+          <p:cNvSpPr>
+            <a:spLocks noGrp="1"/>
+          </p:cNvSpPr>
+          <p:nvPr>
+            <p:ph type="title"/>
+          </p:nvPr>
+        </p:nvSpPr>
+        <p:spPr/>
+        <p:txBody>
+          <a:bodyPr/>
+          <a:lstStyle/>
+          <a:p>
+            <a:r>
+              <a:rPr lang="en-US" dirty="0"/>
+              <a:t>Aside: Full procedure for making safe edits to </a:t>
+            </a:r>
+            <a:r>
+              <a:rPr lang="en-US" dirty="0" err="1"/>
+              <a:t>common_code</a:t>
+            </a:r>
+            <a:endParaRPr lang="en-US" dirty="0"/>
+          </a:p>
+        </p:txBody>
+      </p:sp>
+      <p:sp>
+        <p:nvSpPr>
+          <p:cNvPr id="3" name="Content Placeholder 2">
+            <a:extLst>
+              <a:ext uri="{FF2B5EF4-FFF2-40B4-BE49-F238E27FC236}">
+                <a16:creationId xmlns:a16="http://schemas.microsoft.com/office/drawing/2014/main" id="{DCEA8FFF-D0F9-C8F0-879A-A0BC943F7BAE}"/>
+              </a:ext>
+            </a:extLst>
+          </p:cNvPr>
+          <p:cNvSpPr>
+            <a:spLocks noGrp="1"/>
+          </p:cNvSpPr>
+          <p:nvPr>
+            <p:ph idx="1"/>
+          </p:nvPr>
+        </p:nvSpPr>
+        <p:spPr/>
+        <p:txBody>
+          <a:bodyPr>
+            <a:normAutofit fontScale="77500" lnSpcReduction="20000"/>
+          </a:bodyPr>
+          <a:lstStyle/>
+          <a:p>
+            <a:pPr marL="514350" indent="-514350">
+              <a:buFont typeface="+mj-lt"/>
+              <a:buAutoNum type="arabicPeriod"/>
+            </a:pPr>
+            <a:r>
+              <a:rPr lang="en-US" dirty="0"/>
+              <a:t>Fork the original repo to your GitHub account</a:t>
+            </a:r>
+          </a:p>
+          <a:p>
+            <a:pPr marL="514350" indent="-514350">
+              <a:buFont typeface="+mj-lt"/>
+              <a:buAutoNum type="arabicPeriod"/>
+            </a:pPr>
+            <a:r>
+              <a:rPr lang="en-US" dirty="0"/>
+              <a:t>Clone this forked repo to your local machine</a:t>
+            </a:r>
+          </a:p>
+          <a:p>
+            <a:pPr marL="514350" indent="-514350">
+              <a:buFont typeface="+mj-lt"/>
+              <a:buAutoNum type="arabicPeriod"/>
+            </a:pPr>
+            <a:r>
+              <a:rPr lang="en-US" dirty="0"/>
+              <a:t>Open a </a:t>
+            </a:r>
+            <a:r>
+              <a:rPr lang="en-US" b="1" dirty="0"/>
+              <a:t>branch</a:t>
+            </a:r>
+            <a:r>
+              <a:rPr lang="en-US" dirty="0"/>
+              <a:t> for making some edits</a:t>
+            </a:r>
+          </a:p>
+          <a:p>
+            <a:pPr lvl="1"/>
+            <a:r>
+              <a:rPr lang="en-US" dirty="0"/>
+              <a:t>Consider a branch as a complete copy of the package; you can make edits in here safely without affecting the original forked repo (called the “main” or “master” branch)</a:t>
+            </a:r>
+          </a:p>
+          <a:p>
+            <a:pPr marL="514350" indent="-514350">
+              <a:buFont typeface="+mj-lt"/>
+              <a:buAutoNum type="arabicPeriod"/>
+            </a:pPr>
+            <a:r>
+              <a:rPr lang="en-US" dirty="0"/>
+              <a:t>When you’re done editing, </a:t>
+            </a:r>
+            <a:r>
+              <a:rPr lang="en-US" b="1" dirty="0"/>
+              <a:t>push</a:t>
+            </a:r>
+            <a:r>
+              <a:rPr lang="en-US" dirty="0"/>
+              <a:t> this new branch to your forked version of </a:t>
+            </a:r>
+            <a:r>
+              <a:rPr lang="en-US" dirty="0" err="1"/>
+              <a:t>common_code</a:t>
+            </a:r>
+            <a:endParaRPr lang="en-US" dirty="0"/>
+          </a:p>
+          <a:p>
+            <a:pPr marL="514350" indent="-514350">
+              <a:buFont typeface="+mj-lt"/>
+              <a:buAutoNum type="arabicPeriod"/>
+            </a:pPr>
+            <a:r>
+              <a:rPr lang="en-US" dirty="0"/>
+              <a:t>Submit a </a:t>
+            </a:r>
+            <a:r>
+              <a:rPr lang="en-US" b="1" dirty="0"/>
+              <a:t>pull request</a:t>
+            </a:r>
+            <a:r>
+              <a:rPr lang="en-US" dirty="0"/>
+              <a:t> to the owner(s) of </a:t>
+            </a:r>
+            <a:r>
+              <a:rPr lang="en-US" dirty="0" err="1"/>
+              <a:t>common_code</a:t>
+            </a:r>
+            <a:r>
+              <a:rPr lang="en-US" dirty="0"/>
+              <a:t> who will review the changes and </a:t>
+            </a:r>
+            <a:r>
+              <a:rPr lang="en-US" b="1" dirty="0"/>
+              <a:t>merge</a:t>
+            </a:r>
+            <a:r>
+              <a:rPr lang="en-US" dirty="0"/>
+              <a:t> everything if it looks OK</a:t>
+            </a:r>
+          </a:p>
+          <a:p>
+            <a:pPr lvl="1"/>
+            <a:r>
+              <a:rPr lang="en-US" dirty="0"/>
+              <a:t>A “pull request” means that you are requesting the owner(s) of </a:t>
+            </a:r>
+            <a:r>
+              <a:rPr lang="en-US" dirty="0" err="1"/>
+              <a:t>common_code</a:t>
+            </a:r>
+            <a:r>
+              <a:rPr lang="en-US" dirty="0"/>
+              <a:t> to “pull” your edited version of the code into their version</a:t>
+            </a:r>
+          </a:p>
+          <a:p>
+            <a:pPr lvl="1"/>
+            <a:r>
+              <a:rPr lang="en-US" dirty="0"/>
+              <a:t>Note that a “pull </a:t>
+            </a:r>
+            <a:r>
+              <a:rPr lang="en-US" u="sng" dirty="0"/>
+              <a:t>request</a:t>
+            </a:r>
+            <a:r>
+              <a:rPr lang="en-US" dirty="0"/>
+              <a:t>” is different from the command “git pull”</a:t>
+            </a:r>
+          </a:p>
+          <a:p>
+            <a:pPr marL="514350" indent="-514350">
+              <a:buFont typeface="+mj-lt"/>
+              <a:buAutoNum type="arabicPeriod"/>
+            </a:pPr>
+            <a:r>
+              <a:rPr lang="en-US" dirty="0"/>
+              <a:t>Delete the temporary branch from </a:t>
+            </a:r>
+            <a:r>
+              <a:rPr lang="en-US" b="1" dirty="0"/>
+              <a:t>BOTH</a:t>
+            </a:r>
+            <a:r>
+              <a:rPr lang="en-US" dirty="0"/>
+              <a:t> your remote forked repo (in GitHub) and off your local machine </a:t>
+            </a:r>
+            <a:r>
+              <a:rPr lang="en-US" b="1" dirty="0"/>
+              <a:t>IF </a:t>
+            </a:r>
+            <a:r>
+              <a:rPr lang="en-US" dirty="0"/>
+              <a:t>the pull request gets approved &amp; implemented</a:t>
+            </a:r>
+          </a:p>
+        </p:txBody>
+      </p:sp>
+    </p:spTree>
+    <p:extLst>
+      <p:ext uri="{BB962C8B-B14F-4D97-AF65-F5344CB8AC3E}">
+        <p14:creationId xmlns:p14="http://schemas.microsoft.com/office/powerpoint/2010/main" val="1647839736"/>
       </p:ext>
     </p:extLst>
   </p:cSld>
@@ -5977,4 +8311,319 @@
     </a:ext>
   </a:extLst>
 </a:theme>
+</file>
+
+<file path=ppt/theme/theme2.xml><?xml version="1.0" encoding="utf-8"?>
+<a:theme xmlns:a="http://schemas.openxmlformats.org/drawingml/2006/main" name="Office Theme">
+  <a:themeElements>
+    <a:clrScheme name="Office">
+      <a:dk1>
+        <a:sysClr val="windowText" lastClr="000000"/>
+      </a:dk1>
+      <a:lt1>
+        <a:sysClr val="window" lastClr="FFFFFF"/>
+      </a:lt1>
+      <a:dk2>
+        <a:srgbClr val="0E2841"/>
+      </a:dk2>
+      <a:lt2>
+        <a:srgbClr val="E8E8E8"/>
+      </a:lt2>
+      <a:accent1>
+        <a:srgbClr val="156082"/>
+      </a:accent1>
+      <a:accent2>
+        <a:srgbClr val="E97132"/>
+      </a:accent2>
+      <a:accent3>
+        <a:srgbClr val="196B24"/>
+      </a:accent3>
+      <a:accent4>
+        <a:srgbClr val="0F9ED5"/>
+      </a:accent4>
+      <a:accent5>
+        <a:srgbClr val="A02B93"/>
+      </a:accent5>
+      <a:accent6>
+        <a:srgbClr val="4EA72E"/>
+      </a:accent6>
+      <a:hlink>
+        <a:srgbClr val="467886"/>
+      </a:hlink>
+      <a:folHlink>
+        <a:srgbClr val="96607D"/>
+      </a:folHlink>
+    </a:clrScheme>
+    <a:fontScheme name="Office">
+      <a:majorFont>
+        <a:latin typeface="Aptos Display" panose="02110004020202020204"/>
+        <a:ea typeface=""/>
+        <a:cs typeface=""/>
+        <a:font script="Jpan" typeface="游ゴシック Light"/>
+        <a:font script="Hang" typeface="맑은 고딕"/>
+        <a:font script="Hans" typeface="等线 Light"/>
+        <a:font script="Hant" typeface="新細明體"/>
+        <a:font script="Arab" typeface="Times New Roman"/>
+        <a:font script="Hebr" typeface="Times New Roman"/>
+        <a:font script="Thai" typeface="Angsana New"/>
+        <a:font script="Ethi" typeface="Nyala"/>
+        <a:font script="Beng" typeface="Vrinda"/>
+        <a:font script="Gujr" typeface="Shruti"/>
+        <a:font script="Khmr" typeface="MoolBoran"/>
+        <a:font script="Knda" typeface="Tunga"/>
+        <a:font script="Guru" typeface="Raavi"/>
+        <a:font script="Cans" typeface="Euphemia"/>
+        <a:font script="Cher" typeface="Plantagenet Cherokee"/>
+        <a:font script="Yiii" typeface="Microsoft Yi Baiti"/>
+        <a:font script="Tibt" typeface="Microsoft Himalaya"/>
+        <a:font script="Thaa" typeface="MV Boli"/>
+        <a:font script="Deva" typeface="Mangal"/>
+        <a:font script="Telu" typeface="Gautami"/>
+        <a:font script="Taml" typeface="Latha"/>
+        <a:font script="Syrc" typeface="Estrangelo Edessa"/>
+        <a:font script="Orya" typeface="Kalinga"/>
+        <a:font script="Mlym" typeface="Kartika"/>
+        <a:font script="Laoo" typeface="DokChampa"/>
+        <a:font script="Sinh" typeface="Iskoola Pota"/>
+        <a:font script="Mong" typeface="Mongolian Baiti"/>
+        <a:font script="Viet" typeface="Times New Roman"/>
+        <a:font script="Uigh" typeface="Microsoft Uighur"/>
+        <a:font script="Geor" typeface="Sylfaen"/>
+        <a:font script="Armn" typeface="Arial"/>
+        <a:font script="Bugi" typeface="Leelawadee UI"/>
+        <a:font script="Bopo" typeface="Microsoft JhengHei"/>
+        <a:font script="Java" typeface="Javanese Text"/>
+        <a:font script="Lisu" typeface="Segoe UI"/>
+        <a:font script="Mymr" typeface="Myanmar Text"/>
+        <a:font script="Nkoo" typeface="Ebrima"/>
+        <a:font script="Olck" typeface="Nirmala UI"/>
+        <a:font script="Osma" typeface="Ebrima"/>
+        <a:font script="Phag" typeface="Phagspa"/>
+        <a:font script="Syrn" typeface="Estrangelo Edessa"/>
+        <a:font script="Syrj" typeface="Estrangelo Edessa"/>
+        <a:font script="Syre" typeface="Estrangelo Edessa"/>
+        <a:font script="Sora" typeface="Nirmala UI"/>
+        <a:font script="Tale" typeface="Microsoft Tai Le"/>
+        <a:font script="Talu" typeface="Microsoft New Tai Lue"/>
+        <a:font script="Tfng" typeface="Ebrima"/>
+      </a:majorFont>
+      <a:minorFont>
+        <a:latin typeface="Aptos" panose="02110004020202020204"/>
+        <a:ea typeface=""/>
+        <a:cs typeface=""/>
+        <a:font script="Jpan" typeface="游ゴシック"/>
+        <a:font script="Hang" typeface="맑은 고딕"/>
+        <a:font script="Hans" typeface="等线"/>
+        <a:font script="Hant" typeface="新細明體"/>
+        <a:font script="Arab" typeface="Arial"/>
+        <a:font script="Hebr" typeface="Arial"/>
+        <a:font script="Thai" typeface="Cordia New"/>
+        <a:font script="Ethi" typeface="Nyala"/>
+        <a:font script="Beng" typeface="Vrinda"/>
+        <a:font script="Gujr" typeface="Shruti"/>
+        <a:font script="Khmr" typeface="DaunPenh"/>
+        <a:font script="Knda" typeface="Tunga"/>
+        <a:font script="Guru" typeface="Raavi"/>
+        <a:font script="Cans" typeface="Euphemia"/>
+        <a:font script="Cher" typeface="Plantagenet Cherokee"/>
+        <a:font script="Yiii" typeface="Microsoft Yi Baiti"/>
+        <a:font script="Tibt" typeface="Microsoft Himalaya"/>
+        <a:font script="Thaa" typeface="MV Boli"/>
+        <a:font script="Deva" typeface="Mangal"/>
+        <a:font script="Telu" typeface="Gautami"/>
+        <a:font script="Taml" typeface="Latha"/>
+        <a:font script="Syrc" typeface="Estrangelo Edessa"/>
+        <a:font script="Orya" typeface="Kalinga"/>
+        <a:font script="Mlym" typeface="Kartika"/>
+        <a:font script="Laoo" typeface="DokChampa"/>
+        <a:font script="Sinh" typeface="Iskoola Pota"/>
+        <a:font script="Mong" typeface="Mongolian Baiti"/>
+        <a:font script="Viet" typeface="Arial"/>
+        <a:font script="Uigh" typeface="Microsoft Uighur"/>
+        <a:font script="Geor" typeface="Sylfaen"/>
+        <a:font script="Armn" typeface="Arial"/>
+        <a:font script="Bugi" typeface="Leelawadee UI"/>
+        <a:font script="Bopo" typeface="Microsoft JhengHei"/>
+        <a:font script="Java" typeface="Javanese Text"/>
+        <a:font script="Lisu" typeface="Segoe UI"/>
+        <a:font script="Mymr" typeface="Myanmar Text"/>
+        <a:font script="Nkoo" typeface="Ebrima"/>
+        <a:font script="Olck" typeface="Nirmala UI"/>
+        <a:font script="Osma" typeface="Ebrima"/>
+        <a:font script="Phag" typeface="Phagspa"/>
+        <a:font script="Syrn" typeface="Estrangelo Edessa"/>
+        <a:font script="Syrj" typeface="Estrangelo Edessa"/>
+        <a:font script="Syre" typeface="Estrangelo Edessa"/>
+        <a:font script="Sora" typeface="Nirmala UI"/>
+        <a:font script="Tale" typeface="Microsoft Tai Le"/>
+        <a:font script="Talu" typeface="Microsoft New Tai Lue"/>
+        <a:font script="Tfng" typeface="Ebrima"/>
+      </a:minorFont>
+    </a:fontScheme>
+    <a:fmtScheme name="Office">
+      <a:fillStyleLst>
+        <a:solidFill>
+          <a:schemeClr val="phClr"/>
+        </a:solidFill>
+        <a:gradFill rotWithShape="1">
+          <a:gsLst>
+            <a:gs pos="0">
+              <a:schemeClr val="phClr">
+                <a:lumMod val="110000"/>
+                <a:satMod val="105000"/>
+                <a:tint val="67000"/>
+              </a:schemeClr>
+            </a:gs>
+            <a:gs pos="50000">
+              <a:schemeClr val="phClr">
+                <a:lumMod val="105000"/>
+                <a:satMod val="103000"/>
+                <a:tint val="73000"/>
+              </a:schemeClr>
+            </a:gs>
+            <a:gs pos="100000">
+              <a:schemeClr val="phClr">
+                <a:lumMod val="105000"/>
+                <a:satMod val="109000"/>
+                <a:tint val="81000"/>
+              </a:schemeClr>
+            </a:gs>
+          </a:gsLst>
+          <a:lin ang="5400000" scaled="0"/>
+        </a:gradFill>
+        <a:gradFill rotWithShape="1">
+          <a:gsLst>
+            <a:gs pos="0">
+              <a:schemeClr val="phClr">
+                <a:satMod val="103000"/>
+                <a:lumMod val="102000"/>
+                <a:tint val="94000"/>
+              </a:schemeClr>
+            </a:gs>
+            <a:gs pos="50000">
+              <a:schemeClr val="phClr">
+                <a:satMod val="110000"/>
+                <a:lumMod val="100000"/>
+                <a:shade val="100000"/>
+              </a:schemeClr>
+            </a:gs>
+            <a:gs pos="100000">
+              <a:schemeClr val="phClr">
+                <a:lumMod val="99000"/>
+                <a:satMod val="120000"/>
+                <a:shade val="78000"/>
+              </a:schemeClr>
+            </a:gs>
+          </a:gsLst>
+          <a:lin ang="5400000" scaled="0"/>
+        </a:gradFill>
+      </a:fillStyleLst>
+      <a:lnStyleLst>
+        <a:ln w="12700" cap="flat" cmpd="sng" algn="ctr">
+          <a:solidFill>
+            <a:schemeClr val="phClr"/>
+          </a:solidFill>
+          <a:prstDash val="solid"/>
+          <a:miter lim="800000"/>
+        </a:ln>
+        <a:ln w="19050" cap="flat" cmpd="sng" algn="ctr">
+          <a:solidFill>
+            <a:schemeClr val="phClr"/>
+          </a:solidFill>
+          <a:prstDash val="solid"/>
+          <a:miter lim="800000"/>
+        </a:ln>
+        <a:ln w="25400" cap="flat" cmpd="sng" algn="ctr">
+          <a:solidFill>
+            <a:schemeClr val="phClr"/>
+          </a:solidFill>
+          <a:prstDash val="solid"/>
+          <a:miter lim="800000"/>
+        </a:ln>
+      </a:lnStyleLst>
+      <a:effectStyleLst>
+        <a:effectStyle>
+          <a:effectLst/>
+        </a:effectStyle>
+        <a:effectStyle>
+          <a:effectLst/>
+        </a:effectStyle>
+        <a:effectStyle>
+          <a:effectLst>
+            <a:outerShdw blurRad="57150" dist="19050" dir="5400000" algn="ctr" rotWithShape="0">
+              <a:srgbClr val="000000">
+                <a:alpha val="63000"/>
+              </a:srgbClr>
+            </a:outerShdw>
+          </a:effectLst>
+        </a:effectStyle>
+      </a:effectStyleLst>
+      <a:bgFillStyleLst>
+        <a:solidFill>
+          <a:schemeClr val="phClr"/>
+        </a:solidFill>
+        <a:solidFill>
+          <a:schemeClr val="phClr">
+            <a:tint val="95000"/>
+            <a:satMod val="170000"/>
+          </a:schemeClr>
+        </a:solidFill>
+        <a:gradFill rotWithShape="1">
+          <a:gsLst>
+            <a:gs pos="0">
+              <a:schemeClr val="phClr">
+                <a:tint val="93000"/>
+                <a:satMod val="150000"/>
+                <a:shade val="98000"/>
+                <a:lumMod val="102000"/>
+              </a:schemeClr>
+            </a:gs>
+            <a:gs pos="50000">
+              <a:schemeClr val="phClr">
+                <a:tint val="98000"/>
+                <a:satMod val="130000"/>
+                <a:shade val="90000"/>
+                <a:lumMod val="103000"/>
+              </a:schemeClr>
+            </a:gs>
+            <a:gs pos="100000">
+              <a:schemeClr val="phClr">
+                <a:shade val="63000"/>
+                <a:satMod val="120000"/>
+              </a:schemeClr>
+            </a:gs>
+          </a:gsLst>
+          <a:lin ang="5400000" scaled="0"/>
+        </a:gradFill>
+      </a:bgFillStyleLst>
+    </a:fmtScheme>
+  </a:themeElements>
+  <a:objectDefaults>
+    <a:lnDef>
+      <a:spPr/>
+      <a:bodyPr/>
+      <a:lstStyle/>
+      <a:style>
+        <a:lnRef idx="2">
+          <a:schemeClr val="accent1"/>
+        </a:lnRef>
+        <a:fillRef idx="0">
+          <a:schemeClr val="accent1"/>
+        </a:fillRef>
+        <a:effectRef idx="1">
+          <a:schemeClr val="accent1"/>
+        </a:effectRef>
+        <a:fontRef idx="minor">
+          <a:schemeClr val="tx1"/>
+        </a:fontRef>
+      </a:style>
+    </a:lnDef>
+  </a:objectDefaults>
+  <a:extraClrSchemeLst/>
+  <a:extLst>
+    <a:ext uri="{05A4C25C-085E-4340-85A3-A5531E510DB2}">
+      <thm15:themeFamily xmlns:thm15="http://schemas.microsoft.com/office/thememl/2012/main" name="Office Theme" id="{2E142A2C-CD16-42D6-873A-C26D2A0506FA}" vid="{1BDDFF52-6CD6-40A5-AB3C-68EB2F1E4D0A}"/>
+    </a:ext>
+  </a:extLst>
+</a:theme>
 </file>
</xml_diff>